<commit_message>
Git temel ve Commit temel komutları eklendi
</commit_message>
<xml_diff>
--- a/Gitsunum.pptx
+++ b/Gitsunum.pptx
@@ -8,6 +8,7 @@
     <p:sldId id="256" r:id="rId2"/>
     <p:sldId id="257" r:id="rId3"/>
     <p:sldId id="258" r:id="rId4"/>
+    <p:sldId id="259" r:id="rId5"/>
   </p:sldIdLst>
   <p:sldSz cx="12192000" cy="6858000"/>
   <p:notesSz cx="6858000" cy="9144000"/>
@@ -119,7 +120,7 @@
   <p1510:revLst>
     <p1510:client id="{08D64386-19A3-6B06-AD19-AA732D24D73D}" v="11" dt="2025-03-07T10:18:55.338"/>
     <p1510:client id="{220426D4-292A-19F7-1104-2898146CA523}" v="1" dt="2025-03-07T09:52:54.804"/>
-    <p1510:client id="{A123BB24-4108-EFFD-8D12-5C3EE2CA58CD}" v="143" dt="2025-03-07T11:06:57.435"/>
+    <p1510:client id="{A123BB24-4108-EFFD-8D12-5C3EE2CA58CD}" v="377" dt="2025-03-07T11:13:53.795"/>
     <p1510:client id="{CEF14E3E-4315-2E37-2315-E7B5AC358147}" v="125" dt="2025-03-07T10:30:54.841"/>
   </p1510:revLst>
 </p1510:revInfo>
@@ -146,12 +147,27 @@
   <pc:docChgLst>
     <pc:chgData name="beren sarı" userId="ee17b9781157bf7b" providerId="Windows Live" clId="Web-{A123BB24-4108-EFFD-8D12-5C3EE2CA58CD}"/>
     <pc:docChg chg="addSld modSld">
-      <pc:chgData name="beren sarı" userId="ee17b9781157bf7b" providerId="Windows Live" clId="Web-{A123BB24-4108-EFFD-8D12-5C3EE2CA58CD}" dt="2025-03-07T11:06:57.435" v="142" actId="20577"/>
+      <pc:chgData name="beren sarı" userId="ee17b9781157bf7b" providerId="Windows Live" clId="Web-{A123BB24-4108-EFFD-8D12-5C3EE2CA58CD}" dt="2025-03-07T11:13:53.795" v="379" actId="20577"/>
       <pc:docMkLst>
         <pc:docMk/>
       </pc:docMkLst>
+      <pc:sldChg chg="modSp">
+        <pc:chgData name="beren sarı" userId="ee17b9781157bf7b" providerId="Windows Live" clId="Web-{A123BB24-4108-EFFD-8D12-5C3EE2CA58CD}" dt="2025-03-07T11:13:53.795" v="379" actId="20577"/>
+        <pc:sldMkLst>
+          <pc:docMk/>
+          <pc:sldMk cId="42641949" sldId="257"/>
+        </pc:sldMkLst>
+        <pc:spChg chg="mod">
+          <ac:chgData name="beren sarı" userId="ee17b9781157bf7b" providerId="Windows Live" clId="Web-{A123BB24-4108-EFFD-8D12-5C3EE2CA58CD}" dt="2025-03-07T11:13:53.795" v="379" actId="20577"/>
+          <ac:spMkLst>
+            <pc:docMk/>
+            <pc:sldMk cId="42641949" sldId="257"/>
+            <ac:spMk id="3" creationId="{407B23B2-DB04-F5B1-2DBB-6F5340990023}"/>
+          </ac:spMkLst>
+        </pc:spChg>
+      </pc:sldChg>
       <pc:sldChg chg="modSp new">
-        <pc:chgData name="beren sarı" userId="ee17b9781157bf7b" providerId="Windows Live" clId="Web-{A123BB24-4108-EFFD-8D12-5C3EE2CA58CD}" dt="2025-03-07T11:06:57.435" v="142" actId="20577"/>
+        <pc:chgData name="beren sarı" userId="ee17b9781157bf7b" providerId="Windows Live" clId="Web-{A123BB24-4108-EFFD-8D12-5C3EE2CA58CD}" dt="2025-03-07T11:11:31.743" v="271" actId="20577"/>
         <pc:sldMkLst>
           <pc:docMk/>
           <pc:sldMk cId="3217141839" sldId="258"/>
@@ -165,11 +181,26 @@
           </ac:spMkLst>
         </pc:spChg>
         <pc:spChg chg="mod">
-          <ac:chgData name="beren sarı" userId="ee17b9781157bf7b" providerId="Windows Live" clId="Web-{A123BB24-4108-EFFD-8D12-5C3EE2CA58CD}" dt="2025-03-07T11:06:57.435" v="142" actId="20577"/>
+          <ac:chgData name="beren sarı" userId="ee17b9781157bf7b" providerId="Windows Live" clId="Web-{A123BB24-4108-EFFD-8D12-5C3EE2CA58CD}" dt="2025-03-07T11:11:31.743" v="271" actId="20577"/>
           <ac:spMkLst>
             <pc:docMk/>
             <pc:sldMk cId="3217141839" sldId="258"/>
             <ac:spMk id="3" creationId="{B42A72AF-52F4-BF8E-2BEA-B642BBA7779E}"/>
+          </ac:spMkLst>
+        </pc:spChg>
+      </pc:sldChg>
+      <pc:sldChg chg="modSp new">
+        <pc:chgData name="beren sarı" userId="ee17b9781157bf7b" providerId="Windows Live" clId="Web-{A123BB24-4108-EFFD-8D12-5C3EE2CA58CD}" dt="2025-03-07T11:08:52.471" v="149" actId="20577"/>
+        <pc:sldMkLst>
+          <pc:docMk/>
+          <pc:sldMk cId="3785688334" sldId="259"/>
+        </pc:sldMkLst>
+        <pc:spChg chg="mod">
+          <ac:chgData name="beren sarı" userId="ee17b9781157bf7b" providerId="Windows Live" clId="Web-{A123BB24-4108-EFFD-8D12-5C3EE2CA58CD}" dt="2025-03-07T11:08:52.471" v="149" actId="20577"/>
+          <ac:spMkLst>
+            <pc:docMk/>
+            <pc:sldMk cId="3785688334" sldId="259"/>
+            <ac:spMk id="2" creationId="{9203048A-6235-7A5D-8AA2-4EC2E148FC22}"/>
           </ac:spMkLst>
         </pc:spChg>
       </pc:sldChg>
@@ -4092,41 +4123,138 @@
           <a:p>
             <a:pPr marL="383540" indent="-383540"/>
             <a:r>
-              <a:rPr lang="tr-TR" sz="2800"/>
+              <a:rPr lang="tr-TR" sz="2400" dirty="0"/>
               <a:t>Git bir versiyon kontrol sistemi olup Linux'un kurucusu </a:t>
             </a:r>
             <a:r>
-              <a:rPr lang="tr-TR" sz="2800" err="1"/>
+              <a:rPr lang="tr-TR" sz="2400" err="1"/>
               <a:t>Linus</a:t>
             </a:r>
             <a:r>
-              <a:rPr lang="tr-TR" sz="2800"/>
+              <a:rPr lang="tr-TR" sz="2400" dirty="0"/>
               <a:t> </a:t>
             </a:r>
             <a:r>
-              <a:rPr lang="tr-TR" sz="2800" err="1"/>
+              <a:rPr lang="tr-TR" sz="2400" err="1"/>
               <a:t>Torvalds</a:t>
             </a:r>
             <a:r>
-              <a:rPr lang="tr-TR" sz="2800"/>
-              <a:t> Tarafından </a:t>
-            </a:r>
-            <a:r>
-              <a:rPr lang="tr-TR" sz="2800" err="1"/>
+              <a:rPr lang="tr-TR" sz="2400"/>
+              <a:t> tarafından </a:t>
+            </a:r>
+            <a:r>
+              <a:rPr lang="tr-TR" sz="2400" err="1"/>
               <a:t>geliştirilmiştir.Bir</a:t>
             </a:r>
             <a:r>
-              <a:rPr lang="tr-TR" sz="2800"/>
+              <a:rPr lang="tr-TR" sz="2400"/>
               <a:t> </a:t>
             </a:r>
             <a:r>
-              <a:rPr lang="tr-TR" sz="2800" err="1"/>
+              <a:rPr lang="tr-TR" sz="2400" err="1"/>
               <a:t>checkpoint</a:t>
             </a:r>
             <a:r>
-              <a:rPr lang="tr-TR" sz="2800"/>
+              <a:rPr lang="tr-TR" sz="2400" dirty="0"/>
               <a:t> sistemini andıran Git temel olarak üzerinde çalıştığımız projeyi adım adım izlememize yardım olur.</a:t>
             </a:r>
+          </a:p>
+          <a:p>
+            <a:pPr marL="383540" indent="-383540"/>
+            <a:r>
+              <a:rPr lang="tr-TR" b="1" err="1"/>
+              <a:t>Git'e</a:t>
+            </a:r>
+            <a:r>
+              <a:rPr lang="tr-TR" b="1" dirty="0"/>
+              <a:t> başlamadan önce yapılması gereken örnek komutlar:</a:t>
+            </a:r>
+          </a:p>
+          <a:p>
+            <a:pPr marL="383540" indent="-383540"/>
+            <a:r>
+              <a:rPr lang="tr-TR" sz="1800" dirty="0"/>
+              <a:t>Git </a:t>
+            </a:r>
+            <a:r>
+              <a:rPr lang="tr-TR" sz="1800" dirty="0" err="1"/>
+              <a:t>config</a:t>
+            </a:r>
+            <a:r>
+              <a:rPr lang="tr-TR" sz="1800" dirty="0"/>
+              <a:t> –-global user.name "Name </a:t>
+            </a:r>
+            <a:r>
+              <a:rPr lang="tr-TR" sz="1800" dirty="0" err="1"/>
+              <a:t>Surname</a:t>
+            </a:r>
+            <a:r>
+              <a:rPr lang="tr-TR" sz="1800" dirty="0"/>
+              <a:t>" = Sisteme ad </a:t>
+            </a:r>
+            <a:r>
+              <a:rPr lang="tr-TR" sz="1800" dirty="0" err="1"/>
+              <a:t>soyad</a:t>
+            </a:r>
+            <a:r>
+              <a:rPr lang="tr-TR" sz="1800" dirty="0"/>
+              <a:t> </a:t>
+            </a:r>
+            <a:r>
+              <a:rPr lang="tr-TR" sz="1800" dirty="0" err="1"/>
+              <a:t>kayıdı</a:t>
+            </a:r>
+            <a:r>
+              <a:rPr lang="tr-TR" sz="1800" dirty="0"/>
+              <a:t>.</a:t>
+            </a:r>
+          </a:p>
+          <a:p>
+            <a:pPr marL="383540" indent="-383540"/>
+            <a:r>
+              <a:rPr lang="tr-TR" sz="1800" dirty="0"/>
+              <a:t>Git </a:t>
+            </a:r>
+            <a:r>
+              <a:rPr lang="tr-TR" sz="1800" dirty="0" err="1"/>
+              <a:t>config</a:t>
+            </a:r>
+            <a:r>
+              <a:rPr lang="tr-TR" sz="1800" dirty="0"/>
+              <a:t> –-global </a:t>
+            </a:r>
+            <a:r>
+              <a:rPr lang="tr-TR" sz="1800" dirty="0" err="1"/>
+              <a:t>user.email</a:t>
+            </a:r>
+            <a:r>
+              <a:rPr lang="tr-TR" sz="1800" dirty="0"/>
+              <a:t> ornekmail@gmail.com = Sisteme mail </a:t>
+            </a:r>
+            <a:r>
+              <a:rPr lang="tr-TR" sz="1800" dirty="0" err="1"/>
+              <a:t>kayıdı</a:t>
+            </a:r>
+            <a:r>
+              <a:rPr lang="tr-TR" sz="1800" dirty="0"/>
+              <a:t>.</a:t>
+            </a:r>
+          </a:p>
+          <a:p>
+            <a:pPr marL="383540" indent="-383540"/>
+            <a:r>
+              <a:rPr lang="tr-TR" sz="1800" dirty="0"/>
+              <a:t>Git </a:t>
+            </a:r>
+            <a:r>
+              <a:rPr lang="tr-TR" sz="1800" dirty="0" err="1"/>
+              <a:t>init</a:t>
+            </a:r>
+            <a:r>
+              <a:rPr lang="tr-TR" sz="1800"/>
+              <a:t> = Seçili klasöre git i entegre etme.</a:t>
+            </a:r>
+            <a:endParaRPr lang="tr-TR" sz="1800" dirty="0"/>
           </a:p>
         </p:txBody>
       </p:sp>
@@ -4211,7 +4339,7 @@
         <p:spPr/>
         <p:txBody>
           <a:bodyPr vert="horz" lIns="91440" tIns="45720" rIns="91440" bIns="45720" rtlCol="0" anchor="t">
-            <a:normAutofit/>
+            <a:normAutofit fontScale="92500" lnSpcReduction="20000"/>
           </a:bodyPr>
           <a:lstStyle/>
           <a:p>
@@ -4227,7 +4355,7 @@
               <a:t>işlermler</a:t>
             </a:r>
             <a:r>
-              <a:rPr lang="tr-TR"/>
+              <a:rPr lang="tr-TR" dirty="0"/>
               <a:t> sonrası Git sisteminde yaptığımız her </a:t>
             </a:r>
             <a:r>
@@ -4268,10 +4396,125 @@
               <a:t>commite</a:t>
             </a:r>
             <a:r>
-              <a:rPr lang="tr-TR"/>
+              <a:rPr lang="tr-TR" dirty="0"/>
               <a:t> geçebiliriz.</a:t>
             </a:r>
+          </a:p>
+          <a:p>
+            <a:pPr marL="0" indent="0">
+              <a:buNone/>
+            </a:pPr>
             <a:endParaRPr lang="tr-TR" dirty="0"/>
+          </a:p>
+          <a:p>
+            <a:pPr marL="0" indent="0">
+              <a:buNone/>
+            </a:pPr>
+            <a:r>
+              <a:rPr lang="tr-TR" dirty="0"/>
+              <a:t>Örnek Komutlar:</a:t>
+            </a:r>
+          </a:p>
+          <a:p>
+            <a:pPr marL="0" indent="0">
+              <a:buNone/>
+            </a:pPr>
+            <a:r>
+              <a:rPr lang="tr-TR" dirty="0"/>
+              <a:t>Git </a:t>
+            </a:r>
+            <a:r>
+              <a:rPr lang="tr-TR" dirty="0" err="1"/>
+              <a:t>add</a:t>
+            </a:r>
+            <a:r>
+              <a:rPr lang="tr-TR" dirty="0"/>
+              <a:t> "</a:t>
+            </a:r>
+            <a:r>
+              <a:rPr lang="tr-TR" dirty="0" err="1"/>
+              <a:t>dosyaadı</a:t>
+            </a:r>
+            <a:r>
+              <a:rPr lang="tr-TR" dirty="0"/>
+              <a:t>" = Seçili dosyayı depo alanına eklenmesini sağlar.</a:t>
+            </a:r>
+          </a:p>
+          <a:p>
+            <a:pPr marL="0" indent="0">
+              <a:buNone/>
+            </a:pPr>
+            <a:r>
+              <a:rPr lang="tr-TR" dirty="0"/>
+              <a:t>Git </a:t>
+            </a:r>
+            <a:r>
+              <a:rPr lang="tr-TR" err="1"/>
+              <a:t>commit</a:t>
+            </a:r>
+            <a:r>
+              <a:rPr lang="tr-TR" dirty="0"/>
+              <a:t> –m "</a:t>
+            </a:r>
+            <a:r>
+              <a:rPr lang="tr-TR" err="1"/>
+              <a:t>Save</a:t>
+            </a:r>
+            <a:r>
+              <a:rPr lang="tr-TR" dirty="0"/>
+              <a:t> in detayı" = Seçili dosya üzerinde yapılan </a:t>
+            </a:r>
+            <a:r>
+              <a:rPr lang="tr-TR" err="1"/>
+              <a:t>save</a:t>
+            </a:r>
+            <a:r>
+              <a:rPr lang="tr-TR" dirty="0"/>
+              <a:t> i </a:t>
+            </a:r>
+            <a:r>
+              <a:rPr lang="tr-TR" err="1"/>
+              <a:t>gite</a:t>
+            </a:r>
+            <a:r>
+              <a:rPr lang="tr-TR" dirty="0"/>
+              <a:t> yükler.</a:t>
+            </a:r>
+          </a:p>
+          <a:p>
+            <a:pPr marL="0" indent="0">
+              <a:buNone/>
+            </a:pPr>
+            <a:r>
+              <a:rPr lang="tr-TR" dirty="0"/>
+              <a:t>Git log = </a:t>
+            </a:r>
+            <a:r>
+              <a:rPr lang="tr-TR" dirty="0" err="1"/>
+              <a:t>Commitleri</a:t>
+            </a:r>
+            <a:r>
+              <a:rPr lang="tr-TR" dirty="0"/>
+              <a:t> görmemize yarar.</a:t>
+            </a:r>
+          </a:p>
+          <a:p>
+            <a:pPr marL="0" indent="0">
+              <a:buNone/>
+            </a:pPr>
+            <a:r>
+              <a:rPr lang="tr-TR" dirty="0"/>
+              <a:t> </a:t>
+            </a:r>
+          </a:p>
+          <a:p>
+            <a:pPr marL="0" indent="0">
+              <a:buNone/>
+            </a:pPr>
+            <a:r>
+              <a:rPr lang="tr-TR" dirty="0"/>
+              <a:t> </a:t>
+            </a:r>
           </a:p>
         </p:txBody>
       </p:sp>
@@ -4279,6 +4522,89 @@
     <p:extLst>
       <p:ext uri="{BB962C8B-B14F-4D97-AF65-F5344CB8AC3E}">
         <p14:creationId xmlns:p14="http://schemas.microsoft.com/office/powerpoint/2010/main" val="3217141839"/>
+      </p:ext>
+    </p:extLst>
+  </p:cSld>
+  <p:clrMapOvr>
+    <a:masterClrMapping/>
+  </p:clrMapOvr>
+</p:sld>
+</file>
+
+<file path=ppt/slides/slide4.xml><?xml version="1.0" encoding="utf-8"?>
+<p:sld xmlns:a="http://schemas.openxmlformats.org/drawingml/2006/main" xmlns:r="http://schemas.openxmlformats.org/officeDocument/2006/relationships" xmlns:p="http://schemas.openxmlformats.org/presentationml/2006/main">
+  <p:cSld>
+    <p:spTree>
+      <p:nvGrpSpPr>
+        <p:cNvPr id="1" name=""/>
+        <p:cNvGrpSpPr/>
+        <p:nvPr/>
+      </p:nvGrpSpPr>
+      <p:grpSpPr>
+        <a:xfrm>
+          <a:off x="0" y="0"/>
+          <a:ext cx="0" cy="0"/>
+          <a:chOff x="0" y="0"/>
+          <a:chExt cx="0" cy="0"/>
+        </a:xfrm>
+      </p:grpSpPr>
+      <p:sp>
+        <p:nvSpPr>
+          <p:cNvPr id="2" name="Başlık 1">
+            <a:extLst>
+              <a:ext uri="{FF2B5EF4-FFF2-40B4-BE49-F238E27FC236}">
+                <a16:creationId xmlns:a16="http://schemas.microsoft.com/office/drawing/2014/main" id="{9203048A-6235-7A5D-8AA2-4EC2E148FC22}"/>
+              </a:ext>
+            </a:extLst>
+          </p:cNvPr>
+          <p:cNvSpPr>
+            <a:spLocks noGrp="1"/>
+          </p:cNvSpPr>
+          <p:nvPr>
+            <p:ph type="title"/>
+          </p:nvPr>
+        </p:nvSpPr>
+        <p:spPr/>
+        <p:txBody>
+          <a:bodyPr/>
+          <a:lstStyle/>
+          <a:p>
+            <a:r>
+              <a:rPr lang="tr-TR" dirty="0" err="1"/>
+              <a:t>Branch</a:t>
+            </a:r>
+          </a:p>
+        </p:txBody>
+      </p:sp>
+      <p:sp>
+        <p:nvSpPr>
+          <p:cNvPr id="3" name="İçerik Yer Tutucusu 2">
+            <a:extLst>
+              <a:ext uri="{FF2B5EF4-FFF2-40B4-BE49-F238E27FC236}">
+                <a16:creationId xmlns:a16="http://schemas.microsoft.com/office/drawing/2014/main" id="{D57802A8-156E-ED92-91CA-C722CF1FF6C9}"/>
+              </a:ext>
+            </a:extLst>
+          </p:cNvPr>
+          <p:cNvSpPr>
+            <a:spLocks noGrp="1"/>
+          </p:cNvSpPr>
+          <p:nvPr>
+            <p:ph idx="1"/>
+          </p:nvPr>
+        </p:nvSpPr>
+        <p:spPr/>
+        <p:txBody>
+          <a:bodyPr/>
+          <a:lstStyle/>
+          <a:p>
+            <a:endParaRPr lang="tr-TR"/>
+          </a:p>
+        </p:txBody>
+      </p:sp>
+    </p:spTree>
+    <p:extLst>
+      <p:ext uri="{BB962C8B-B14F-4D97-AF65-F5344CB8AC3E}">
+        <p14:creationId xmlns:p14="http://schemas.microsoft.com/office/powerpoint/2010/main" val="3785688334"/>
       </p:ext>
     </p:extLst>
   </p:cSld>

</xml_diff>

<commit_message>
Branch ve açıklaması eklendi
</commit_message>
<xml_diff>
--- a/Gitsunum.pptx
+++ b/Gitsunum.pptx
@@ -120,7 +120,7 @@
   <p1510:revLst>
     <p1510:client id="{08D64386-19A3-6B06-AD19-AA732D24D73D}" v="11" dt="2025-03-07T10:18:55.338"/>
     <p1510:client id="{220426D4-292A-19F7-1104-2898146CA523}" v="1" dt="2025-03-07T09:52:54.804"/>
-    <p1510:client id="{A123BB24-4108-EFFD-8D12-5C3EE2CA58CD}" v="377" dt="2025-03-07T11:13:53.795"/>
+    <p1510:client id="{A123BB24-4108-EFFD-8D12-5C3EE2CA58CD}" v="383" dt="2025-03-07T11:14:19.280"/>
     <p1510:client id="{CEF14E3E-4315-2E37-2315-E7B5AC358147}" v="125" dt="2025-03-07T10:30:54.841"/>
   </p1510:revLst>
 </p1510:revInfo>
@@ -147,18 +147,18 @@
   <pc:docChgLst>
     <pc:chgData name="beren sarı" userId="ee17b9781157bf7b" providerId="Windows Live" clId="Web-{A123BB24-4108-EFFD-8D12-5C3EE2CA58CD}"/>
     <pc:docChg chg="addSld modSld">
-      <pc:chgData name="beren sarı" userId="ee17b9781157bf7b" providerId="Windows Live" clId="Web-{A123BB24-4108-EFFD-8D12-5C3EE2CA58CD}" dt="2025-03-07T11:13:53.795" v="379" actId="20577"/>
+      <pc:chgData name="beren sarı" userId="ee17b9781157bf7b" providerId="Windows Live" clId="Web-{A123BB24-4108-EFFD-8D12-5C3EE2CA58CD}" dt="2025-03-07T11:14:19.280" v="385" actId="20577"/>
       <pc:docMkLst>
         <pc:docMk/>
       </pc:docMkLst>
       <pc:sldChg chg="modSp">
-        <pc:chgData name="beren sarı" userId="ee17b9781157bf7b" providerId="Windows Live" clId="Web-{A123BB24-4108-EFFD-8D12-5C3EE2CA58CD}" dt="2025-03-07T11:13:53.795" v="379" actId="20577"/>
+        <pc:chgData name="beren sarı" userId="ee17b9781157bf7b" providerId="Windows Live" clId="Web-{A123BB24-4108-EFFD-8D12-5C3EE2CA58CD}" dt="2025-03-07T11:14:19.280" v="385" actId="20577"/>
         <pc:sldMkLst>
           <pc:docMk/>
           <pc:sldMk cId="42641949" sldId="257"/>
         </pc:sldMkLst>
         <pc:spChg chg="mod">
-          <ac:chgData name="beren sarı" userId="ee17b9781157bf7b" providerId="Windows Live" clId="Web-{A123BB24-4108-EFFD-8D12-5C3EE2CA58CD}" dt="2025-03-07T11:13:53.795" v="379" actId="20577"/>
+          <ac:chgData name="beren sarı" userId="ee17b9781157bf7b" providerId="Windows Live" clId="Web-{A123BB24-4108-EFFD-8D12-5C3EE2CA58CD}" dt="2025-03-07T11:14:19.280" v="385" actId="20577"/>
           <ac:spMkLst>
             <pc:docMk/>
             <pc:sldMk cId="42641949" sldId="257"/>
@@ -4127,7 +4127,7 @@
               <a:t>Git bir versiyon kontrol sistemi olup Linux'un kurucusu </a:t>
             </a:r>
             <a:r>
-              <a:rPr lang="tr-TR" sz="2400" err="1"/>
+              <a:rPr lang="tr-TR" sz="2400" dirty="0" err="1"/>
               <a:t>Linus</a:t>
             </a:r>
             <a:r>
@@ -4135,28 +4135,28 @@
               <a:t> </a:t>
             </a:r>
             <a:r>
-              <a:rPr lang="tr-TR" sz="2400" err="1"/>
+              <a:rPr lang="tr-TR" sz="2400" dirty="0" err="1"/>
               <a:t>Torvalds</a:t>
             </a:r>
             <a:r>
-              <a:rPr lang="tr-TR" sz="2400"/>
+              <a:rPr lang="tr-TR" sz="2400" dirty="0"/>
               <a:t> tarafından </a:t>
             </a:r>
             <a:r>
-              <a:rPr lang="tr-TR" sz="2400" err="1"/>
+              <a:rPr lang="tr-TR" sz="2400" dirty="0" err="1"/>
               <a:t>geliştirilmiştir.Bir</a:t>
             </a:r>
             <a:r>
-              <a:rPr lang="tr-TR" sz="2400"/>
+              <a:rPr lang="tr-TR" sz="2400" dirty="0"/>
               <a:t> </a:t>
             </a:r>
             <a:r>
-              <a:rPr lang="tr-TR" sz="2400" err="1"/>
+              <a:rPr lang="tr-TR" sz="2400" dirty="0" err="1"/>
               <a:t>checkpoint</a:t>
             </a:r>
             <a:r>
               <a:rPr lang="tr-TR" sz="2400" dirty="0"/>
-              <a:t> sistemini andıran Git temel olarak üzerinde çalıştığımız projeyi adım adım izlememize yardım olur.</a:t>
+              <a:t> sistemini andıran Git, temel olarak üzerinde çalıştığımız projeyi adım adım izlememize yardımcı olur.</a:t>
             </a:r>
           </a:p>
           <a:p>
@@ -4216,7 +4216,7 @@
               <a:t>Git </a:t>
             </a:r>
             <a:r>
-              <a:rPr lang="tr-TR" sz="1800" dirty="0" err="1"/>
+              <a:rPr lang="tr-TR" sz="1800" err="1"/>
               <a:t>config</a:t>
             </a:r>
             <a:r>
@@ -4224,7 +4224,7 @@
               <a:t> –-global </a:t>
             </a:r>
             <a:r>
-              <a:rPr lang="tr-TR" sz="1800" dirty="0" err="1"/>
+              <a:rPr lang="tr-TR" sz="1800" err="1"/>
               <a:t>user.email</a:t>
             </a:r>
             <a:r>
@@ -4232,7 +4232,7 @@
               <a:t> ornekmail@gmail.com = Sisteme mail </a:t>
             </a:r>
             <a:r>
-              <a:rPr lang="tr-TR" sz="1800" dirty="0" err="1"/>
+              <a:rPr lang="tr-TR" sz="1800" err="1"/>
               <a:t>kayıdı</a:t>
             </a:r>
             <a:r>
@@ -4251,10 +4251,9 @@
               <a:t>init</a:t>
             </a:r>
             <a:r>
-              <a:rPr lang="tr-TR" sz="1800"/>
+              <a:rPr lang="tr-TR" sz="1800" dirty="0"/>
               <a:t> = Seçili klasöre git i entegre etme.</a:t>
             </a:r>
-            <a:endParaRPr lang="tr-TR" sz="1800" dirty="0"/>
           </a:p>
         </p:txBody>
       </p:sp>

</xml_diff>

<commit_message>
Fast Forward ve Merge Conflict terimleri eklendi
</commit_message>
<xml_diff>
--- a/Gitsunum.pptx
+++ b/Gitsunum.pptx
@@ -120,7 +120,7 @@
   <p1510:revLst>
     <p1510:client id="{08D64386-19A3-6B06-AD19-AA732D24D73D}" v="11" dt="2025-03-07T10:18:55.338"/>
     <p1510:client id="{220426D4-292A-19F7-1104-2898146CA523}" v="1" dt="2025-03-07T09:52:54.804"/>
-    <p1510:client id="{A123BB24-4108-EFFD-8D12-5C3EE2CA58CD}" v="383" dt="2025-03-07T11:14:19.280"/>
+    <p1510:client id="{A123BB24-4108-EFFD-8D12-5C3EE2CA58CD}" v="1435" dt="2025-03-07T11:52:40.283"/>
     <p1510:client id="{CEF14E3E-4315-2E37-2315-E7B5AC358147}" v="125" dt="2025-03-07T10:30:54.841"/>
   </p1510:revLst>
 </p1510:revInfo>
@@ -147,7 +147,7 @@
   <pc:docChgLst>
     <pc:chgData name="beren sarı" userId="ee17b9781157bf7b" providerId="Windows Live" clId="Web-{A123BB24-4108-EFFD-8D12-5C3EE2CA58CD}"/>
     <pc:docChg chg="addSld modSld">
-      <pc:chgData name="beren sarı" userId="ee17b9781157bf7b" providerId="Windows Live" clId="Web-{A123BB24-4108-EFFD-8D12-5C3EE2CA58CD}" dt="2025-03-07T11:14:19.280" v="385" actId="20577"/>
+      <pc:chgData name="beren sarı" userId="ee17b9781157bf7b" providerId="Windows Live" clId="Web-{A123BB24-4108-EFFD-8D12-5C3EE2CA58CD}" dt="2025-03-07T11:52:40.283" v="927" actId="20577"/>
       <pc:docMkLst>
         <pc:docMk/>
       </pc:docMkLst>
@@ -167,7 +167,7 @@
         </pc:spChg>
       </pc:sldChg>
       <pc:sldChg chg="modSp new">
-        <pc:chgData name="beren sarı" userId="ee17b9781157bf7b" providerId="Windows Live" clId="Web-{A123BB24-4108-EFFD-8D12-5C3EE2CA58CD}" dt="2025-03-07T11:11:31.743" v="271" actId="20577"/>
+        <pc:chgData name="beren sarı" userId="ee17b9781157bf7b" providerId="Windows Live" clId="Web-{A123BB24-4108-EFFD-8D12-5C3EE2CA58CD}" dt="2025-03-07T11:52:40.283" v="927" actId="20577"/>
         <pc:sldMkLst>
           <pc:docMk/>
           <pc:sldMk cId="3217141839" sldId="258"/>
@@ -181,7 +181,7 @@
           </ac:spMkLst>
         </pc:spChg>
         <pc:spChg chg="mod">
-          <ac:chgData name="beren sarı" userId="ee17b9781157bf7b" providerId="Windows Live" clId="Web-{A123BB24-4108-EFFD-8D12-5C3EE2CA58CD}" dt="2025-03-07T11:11:31.743" v="271" actId="20577"/>
+          <ac:chgData name="beren sarı" userId="ee17b9781157bf7b" providerId="Windows Live" clId="Web-{A123BB24-4108-EFFD-8D12-5C3EE2CA58CD}" dt="2025-03-07T11:52:40.283" v="927" actId="20577"/>
           <ac:spMkLst>
             <pc:docMk/>
             <pc:sldMk cId="3217141839" sldId="258"/>
@@ -189,20 +189,68 @@
           </ac:spMkLst>
         </pc:spChg>
       </pc:sldChg>
-      <pc:sldChg chg="modSp new">
-        <pc:chgData name="beren sarı" userId="ee17b9781157bf7b" providerId="Windows Live" clId="Web-{A123BB24-4108-EFFD-8D12-5C3EE2CA58CD}" dt="2025-03-07T11:08:52.471" v="149" actId="20577"/>
+      <pc:sldChg chg="addSp delSp modSp new mod setBg">
+        <pc:chgData name="beren sarı" userId="ee17b9781157bf7b" providerId="Windows Live" clId="Web-{A123BB24-4108-EFFD-8D12-5C3EE2CA58CD}" dt="2025-03-07T11:26:36.636" v="926" actId="20577"/>
         <pc:sldMkLst>
           <pc:docMk/>
           <pc:sldMk cId="3785688334" sldId="259"/>
         </pc:sldMkLst>
         <pc:spChg chg="mod">
-          <ac:chgData name="beren sarı" userId="ee17b9781157bf7b" providerId="Windows Live" clId="Web-{A123BB24-4108-EFFD-8D12-5C3EE2CA58CD}" dt="2025-03-07T11:08:52.471" v="149" actId="20577"/>
+          <ac:chgData name="beren sarı" userId="ee17b9781157bf7b" providerId="Windows Live" clId="Web-{A123BB24-4108-EFFD-8D12-5C3EE2CA58CD}" dt="2025-03-07T11:21:51.109" v="740"/>
           <ac:spMkLst>
             <pc:docMk/>
             <pc:sldMk cId="3785688334" sldId="259"/>
             <ac:spMk id="2" creationId="{9203048A-6235-7A5D-8AA2-4EC2E148FC22}"/>
           </ac:spMkLst>
         </pc:spChg>
+        <pc:spChg chg="del">
+          <ac:chgData name="beren sarı" userId="ee17b9781157bf7b" providerId="Windows Live" clId="Web-{A123BB24-4108-EFFD-8D12-5C3EE2CA58CD}" dt="2025-03-07T11:15:38.346" v="386"/>
+          <ac:spMkLst>
+            <pc:docMk/>
+            <pc:sldMk cId="3785688334" sldId="259"/>
+            <ac:spMk id="3" creationId="{D57802A8-156E-ED92-91CA-C722CF1FF6C9}"/>
+          </ac:spMkLst>
+        </pc:spChg>
+        <pc:spChg chg="add mod">
+          <ac:chgData name="beren sarı" userId="ee17b9781157bf7b" providerId="Windows Live" clId="Web-{A123BB24-4108-EFFD-8D12-5C3EE2CA58CD}" dt="2025-03-07T11:22:55.956" v="759" actId="14100"/>
+          <ac:spMkLst>
+            <pc:docMk/>
+            <pc:sldMk cId="3785688334" sldId="259"/>
+            <ac:spMk id="5" creationId="{7B189C34-6362-B6D9-82CF-B9DE178AAE2A}"/>
+          </ac:spMkLst>
+        </pc:spChg>
+        <pc:spChg chg="add mod">
+          <ac:chgData name="beren sarı" userId="ee17b9781157bf7b" providerId="Windows Live" clId="Web-{A123BB24-4108-EFFD-8D12-5C3EE2CA58CD}" dt="2025-03-07T11:26:36.636" v="926" actId="20577"/>
+          <ac:spMkLst>
+            <pc:docMk/>
+            <pc:sldMk cId="3785688334" sldId="259"/>
+            <ac:spMk id="6" creationId="{C0F86617-E6AA-2034-9E83-2C5CCD5B4274}"/>
+          </ac:spMkLst>
+        </pc:spChg>
+        <pc:spChg chg="add">
+          <ac:chgData name="beren sarı" userId="ee17b9781157bf7b" providerId="Windows Live" clId="Web-{A123BB24-4108-EFFD-8D12-5C3EE2CA58CD}" dt="2025-03-07T11:21:51.109" v="740"/>
+          <ac:spMkLst>
+            <pc:docMk/>
+            <pc:sldMk cId="3785688334" sldId="259"/>
+            <ac:spMk id="10" creationId="{1D868099-6145-4BC0-A5EA-74BEF1776BA9}"/>
+          </ac:spMkLst>
+        </pc:spChg>
+        <pc:spChg chg="add">
+          <ac:chgData name="beren sarı" userId="ee17b9781157bf7b" providerId="Windows Live" clId="Web-{A123BB24-4108-EFFD-8D12-5C3EE2CA58CD}" dt="2025-03-07T11:21:51.109" v="740"/>
+          <ac:spMkLst>
+            <pc:docMk/>
+            <pc:sldMk cId="3785688334" sldId="259"/>
+            <ac:spMk id="12" creationId="{CC1026F7-DECB-49B4-A565-518BBA445471}"/>
+          </ac:spMkLst>
+        </pc:spChg>
+        <pc:picChg chg="add mod ord">
+          <ac:chgData name="beren sarı" userId="ee17b9781157bf7b" providerId="Windows Live" clId="Web-{A123BB24-4108-EFFD-8D12-5C3EE2CA58CD}" dt="2025-03-07T11:21:51.109" v="740"/>
+          <ac:picMkLst>
+            <pc:docMk/>
+            <pc:sldMk cId="3785688334" sldId="259"/>
+            <ac:picMk id="4" creationId="{8774CAE7-ABCE-DD56-B854-949429455FA6}"/>
+          </ac:picMkLst>
+        </pc:picChg>
       </pc:sldChg>
     </pc:docChg>
   </pc:docChgLst>
@@ -4162,7 +4210,7 @@
           <a:p>
             <a:pPr marL="383540" indent="-383540"/>
             <a:r>
-              <a:rPr lang="tr-TR" b="1" err="1"/>
+              <a:rPr lang="tr-TR" b="1" dirty="0" err="1"/>
               <a:t>Git'e</a:t>
             </a:r>
             <a:r>
@@ -4410,7 +4458,7 @@
               <a:buNone/>
             </a:pPr>
             <a:r>
-              <a:rPr lang="tr-TR" dirty="0"/>
+              <a:rPr lang="tr-TR" b="1" dirty="0"/>
               <a:t>Örnek Komutlar:</a:t>
             </a:r>
           </a:p>
@@ -4533,6 +4581,14 @@
 <file path=ppt/slides/slide4.xml><?xml version="1.0" encoding="utf-8"?>
 <p:sld xmlns:a="http://schemas.openxmlformats.org/drawingml/2006/main" xmlns:r="http://schemas.openxmlformats.org/officeDocument/2006/relationships" xmlns:p="http://schemas.openxmlformats.org/presentationml/2006/main">
   <p:cSld>
+    <p:bg>
+      <p:bgPr>
+        <a:solidFill>
+          <a:schemeClr val="bg2"/>
+        </a:solidFill>
+        <a:effectLst/>
+      </p:bgPr>
+    </p:bg>
     <p:spTree>
       <p:nvGrpSpPr>
         <p:cNvPr id="1" name=""/>
@@ -4547,6 +4603,66 @@
           <a:chExt cx="0" cy="0"/>
         </a:xfrm>
       </p:grpSpPr>
+      <p:sp useBgFill="1">
+        <p:nvSpPr>
+          <p:cNvPr id="10" name="Rectangle 9">
+            <a:extLst>
+              <a:ext uri="{FF2B5EF4-FFF2-40B4-BE49-F238E27FC236}">
+                <a16:creationId xmlns:a16="http://schemas.microsoft.com/office/drawing/2014/main" id="{1D868099-6145-4BC0-A5EA-74BEF1776BA9}"/>
+              </a:ext>
+              <a:ext uri="{C183D7F6-B498-43B3-948B-1728B52AA6E4}">
+                <adec:decorative xmlns:adec="http://schemas.microsoft.com/office/drawing/2017/decorative" val="1"/>
+              </a:ext>
+            </a:extLst>
+          </p:cNvPr>
+          <p:cNvSpPr>
+            <a:spLocks noGrp="1" noRot="1" noChangeAspect="1" noMove="1" noResize="1" noEditPoints="1" noAdjustHandles="1" noChangeArrowheads="1" noChangeShapeType="1" noTextEdit="1"/>
+          </p:cNvSpPr>
+          <p:nvPr>
+            <p:extLst>
+              <p:ext uri="{386F3935-93C4-4BCD-93E2-E3B085C9AB24}">
+                <p16:designElem xmlns:p16="http://schemas.microsoft.com/office/powerpoint/2015/main" val="1"/>
+              </p:ext>
+            </p:extLst>
+          </p:nvPr>
+        </p:nvSpPr>
+        <p:spPr>
+          <a:xfrm>
+            <a:off x="0" y="0"/>
+            <a:ext cx="12192000" cy="6858000"/>
+          </a:xfrm>
+          <a:prstGeom prst="rect">
+            <a:avLst/>
+          </a:prstGeom>
+          <a:ln>
+            <a:noFill/>
+          </a:ln>
+        </p:spPr>
+        <p:style>
+          <a:lnRef idx="2">
+            <a:schemeClr val="accent1">
+              <a:shade val="50000"/>
+            </a:schemeClr>
+          </a:lnRef>
+          <a:fillRef idx="1">
+            <a:schemeClr val="accent1"/>
+          </a:fillRef>
+          <a:effectRef idx="0">
+            <a:schemeClr val="accent1"/>
+          </a:effectRef>
+          <a:fontRef idx="minor">
+            <a:schemeClr val="lt1"/>
+          </a:fontRef>
+        </p:style>
+        <p:txBody>
+          <a:bodyPr rtlCol="0" anchor="ctr"/>
+          <a:lstStyle/>
+          <a:p>
+            <a:pPr algn="ctr"/>
+            <a:endParaRPr lang="en-US"/>
+          </a:p>
+        </p:txBody>
+      </p:sp>
       <p:sp>
         <p:nvSpPr>
           <p:cNvPr id="2" name="Başlık 1">
@@ -4563,40 +4679,967 @@
             <p:ph type="title"/>
           </p:nvPr>
         </p:nvSpPr>
-        <p:spPr/>
-        <p:txBody>
-          <a:bodyPr/>
+        <p:spPr>
+          <a:xfrm>
+            <a:off x="8471424" y="1110882"/>
+            <a:ext cx="3053039" cy="1060817"/>
+          </a:xfrm>
+        </p:spPr>
+        <p:txBody>
+          <a:bodyPr vert="horz" lIns="91440" tIns="45720" rIns="91440" bIns="45720" rtlCol="0" anchor="b">
+            <a:normAutofit/>
+          </a:bodyPr>
           <a:lstStyle/>
           <a:p>
             <a:r>
-              <a:rPr lang="tr-TR" dirty="0" err="1"/>
+              <a:rPr lang="en-US" sz="2800"/>
               <a:t>Branch</a:t>
             </a:r>
           </a:p>
         </p:txBody>
       </p:sp>
-      <p:sp>
-        <p:nvSpPr>
-          <p:cNvPr id="3" name="İçerik Yer Tutucusu 2">
+      <p:pic>
+        <p:nvPicPr>
+          <p:cNvPr id="4" name="İçerik Yer Tutucusu 3" descr="diyagram, çizgi, daire, ekran görüntüsü içeren bir resim&#10;&#10;Yapay zeka tarafından oluşturulan içerik yanlış olabilir.">
             <a:extLst>
               <a:ext uri="{FF2B5EF4-FFF2-40B4-BE49-F238E27FC236}">
-                <a16:creationId xmlns:a16="http://schemas.microsoft.com/office/drawing/2014/main" id="{D57802A8-156E-ED92-91CA-C722CF1FF6C9}"/>
+                <a16:creationId xmlns:a16="http://schemas.microsoft.com/office/drawing/2014/main" id="{8774CAE7-ABCE-DD56-B854-949429455FA6}"/>
               </a:ext>
             </a:extLst>
           </p:cNvPr>
-          <p:cNvSpPr>
-            <a:spLocks noGrp="1"/>
-          </p:cNvSpPr>
+          <p:cNvPicPr>
+            <a:picLocks noGrp="1" noChangeAspect="1"/>
+          </p:cNvPicPr>
           <p:nvPr>
             <p:ph idx="1"/>
           </p:nvPr>
-        </p:nvSpPr>
-        <p:spPr/>
-        <p:txBody>
-          <a:bodyPr/>
+        </p:nvPicPr>
+        <p:blipFill>
+          <a:blip r:embed="rId2"/>
+          <a:stretch>
+            <a:fillRect/>
+          </a:stretch>
+        </p:blipFill>
+        <p:spPr>
+          <a:xfrm>
+            <a:off x="634275" y="2161056"/>
+            <a:ext cx="6900380" cy="2535888"/>
+          </a:xfrm>
+          <a:prstGeom prst="rect">
+            <a:avLst/>
+          </a:prstGeom>
+        </p:spPr>
+      </p:pic>
+      <p:sp>
+        <p:nvSpPr>
+          <p:cNvPr id="5" name="Metin kutusu 4">
+            <a:extLst>
+              <a:ext uri="{FF2B5EF4-FFF2-40B4-BE49-F238E27FC236}">
+                <a16:creationId xmlns:a16="http://schemas.microsoft.com/office/drawing/2014/main" id="{7B189C34-6362-B6D9-82CF-B9DE178AAE2A}"/>
+              </a:ext>
+            </a:extLst>
+          </p:cNvPr>
+          <p:cNvSpPr txBox="1"/>
+          <p:nvPr/>
+        </p:nvSpPr>
+        <p:spPr>
+          <a:xfrm>
+            <a:off x="7888017" y="2286000"/>
+            <a:ext cx="3636445" cy="3931920"/>
+          </a:xfrm>
+          <a:prstGeom prst="rect">
+            <a:avLst/>
+          </a:prstGeom>
+        </p:spPr>
+        <p:txBody>
+          <a:bodyPr rot="0" spcFirstLastPara="0" vertOverflow="overflow" horzOverflow="overflow" vert="horz" lIns="91440" tIns="45720" rIns="91440" bIns="45720" numCol="1" spcCol="0" rtlCol="0" fromWordArt="0" anchorCtr="0" forceAA="0" compatLnSpc="1">
+            <a:prstTxWarp prst="textNoShape">
+              <a:avLst/>
+            </a:prstTxWarp>
+            <a:normAutofit/>
+          </a:bodyPr>
           <a:lstStyle/>
           <a:p>
+            <a:pPr marL="383540" indent="-383540" algn="just" defTabSz="914400">
+              <a:lnSpc>
+                <a:spcPct val="94000"/>
+              </a:lnSpc>
+              <a:spcAft>
+                <a:spcPts val="200"/>
+              </a:spcAft>
+              <a:buFont typeface="Franklin Gothic Book" panose="020B0503020102020204" pitchFamily="34" charset="0"/>
+            </a:pPr>
+            <a:r>
+              <a:rPr lang="en-US" sz="1600" dirty="0">
+                <a:solidFill>
+                  <a:schemeClr val="tx2"/>
+                </a:solidFill>
+              </a:rPr>
+              <a:t>        Branch </a:t>
+            </a:r>
+            <a:r>
+              <a:rPr lang="en-US" sz="1600" err="1">
+                <a:solidFill>
+                  <a:schemeClr val="tx2"/>
+                </a:solidFill>
+              </a:rPr>
+              <a:t>aslında</a:t>
+            </a:r>
+            <a:r>
+              <a:rPr lang="en-US" sz="1600" dirty="0">
+                <a:solidFill>
+                  <a:schemeClr val="tx2"/>
+                </a:solidFill>
+              </a:rPr>
+              <a:t> dal </a:t>
+            </a:r>
+            <a:r>
+              <a:rPr lang="en-US" sz="1600" err="1">
+                <a:solidFill>
+                  <a:schemeClr val="tx2"/>
+                </a:solidFill>
+              </a:rPr>
+              <a:t>demektir.Git</a:t>
+            </a:r>
+            <a:r>
+              <a:rPr lang="en-US" sz="1600" dirty="0">
+                <a:solidFill>
+                  <a:schemeClr val="tx2"/>
+                </a:solidFill>
+              </a:rPr>
+              <a:t> </a:t>
+            </a:r>
+            <a:r>
+              <a:rPr lang="en-US" sz="1600" err="1">
+                <a:solidFill>
+                  <a:schemeClr val="tx2"/>
+                </a:solidFill>
+              </a:rPr>
+              <a:t>üzerinde</a:t>
+            </a:r>
+            <a:r>
+              <a:rPr lang="en-US" sz="1600" dirty="0">
+                <a:solidFill>
+                  <a:schemeClr val="tx2"/>
+                </a:solidFill>
+              </a:rPr>
+              <a:t> branch </a:t>
+            </a:r>
+            <a:r>
+              <a:rPr lang="en-US" sz="1600" err="1">
+                <a:solidFill>
+                  <a:schemeClr val="tx2"/>
+                </a:solidFill>
+              </a:rPr>
+              <a:t>ise</a:t>
+            </a:r>
+            <a:r>
+              <a:rPr lang="en-US" sz="1600" dirty="0">
+                <a:solidFill>
+                  <a:schemeClr val="tx2"/>
+                </a:solidFill>
+              </a:rPr>
+              <a:t> </a:t>
+            </a:r>
+            <a:r>
+              <a:rPr lang="en-US" sz="1600" err="1">
+                <a:solidFill>
+                  <a:schemeClr val="tx2"/>
+                </a:solidFill>
+              </a:rPr>
+              <a:t>commitleri</a:t>
+            </a:r>
+            <a:r>
+              <a:rPr lang="en-US" sz="1600" dirty="0">
+                <a:solidFill>
+                  <a:schemeClr val="tx2"/>
+                </a:solidFill>
+              </a:rPr>
+              <a:t> </a:t>
+            </a:r>
+            <a:r>
+              <a:rPr lang="en-US" sz="1600" err="1">
+                <a:solidFill>
+                  <a:schemeClr val="tx2"/>
+                </a:solidFill>
+              </a:rPr>
+              <a:t>dallara</a:t>
+            </a:r>
+            <a:r>
+              <a:rPr lang="en-US" sz="1600" dirty="0">
+                <a:solidFill>
+                  <a:schemeClr val="tx2"/>
+                </a:solidFill>
+              </a:rPr>
+              <a:t> </a:t>
+            </a:r>
+            <a:r>
+              <a:rPr lang="en-US" sz="1600" err="1">
+                <a:solidFill>
+                  <a:schemeClr val="tx2"/>
+                </a:solidFill>
+              </a:rPr>
+              <a:t>ayırmak</a:t>
+            </a:r>
+            <a:r>
+              <a:rPr lang="en-US" sz="1600" dirty="0">
+                <a:solidFill>
+                  <a:schemeClr val="tx2"/>
+                </a:solidFill>
+              </a:rPr>
+              <a:t> </a:t>
+            </a:r>
+            <a:r>
+              <a:rPr lang="en-US" sz="1600" err="1">
+                <a:solidFill>
+                  <a:schemeClr val="tx2"/>
+                </a:solidFill>
+              </a:rPr>
+              <a:t>olarakta</a:t>
+            </a:r>
+            <a:r>
+              <a:rPr lang="en-US" sz="1600" dirty="0">
+                <a:solidFill>
+                  <a:schemeClr val="tx2"/>
+                </a:solidFill>
+              </a:rPr>
+              <a:t> </a:t>
+            </a:r>
+            <a:r>
+              <a:rPr lang="en-US" sz="1600" err="1">
+                <a:solidFill>
+                  <a:schemeClr val="tx2"/>
+                </a:solidFill>
+              </a:rPr>
+              <a:t>adlandırabiliriz.Bir</a:t>
+            </a:r>
+            <a:r>
+              <a:rPr lang="en-US" sz="1600" dirty="0">
+                <a:solidFill>
+                  <a:schemeClr val="tx2"/>
+                </a:solidFill>
+              </a:rPr>
+              <a:t> </a:t>
+            </a:r>
+            <a:r>
+              <a:rPr lang="en-US" sz="1600" err="1">
+                <a:solidFill>
+                  <a:schemeClr val="tx2"/>
+                </a:solidFill>
+              </a:rPr>
+              <a:t>proje</a:t>
+            </a:r>
+            <a:r>
+              <a:rPr lang="en-US" sz="1600" dirty="0">
+                <a:solidFill>
+                  <a:schemeClr val="tx2"/>
+                </a:solidFill>
+              </a:rPr>
+              <a:t> </a:t>
+            </a:r>
+            <a:r>
+              <a:rPr lang="en-US" sz="1600" err="1">
+                <a:solidFill>
+                  <a:schemeClr val="tx2"/>
+                </a:solidFill>
+              </a:rPr>
+              <a:t>üzerinde</a:t>
+            </a:r>
+            <a:r>
+              <a:rPr lang="en-US" sz="1600" dirty="0">
+                <a:solidFill>
+                  <a:schemeClr val="tx2"/>
+                </a:solidFill>
+              </a:rPr>
+              <a:t> </a:t>
+            </a:r>
+            <a:r>
+              <a:rPr lang="en-US" sz="1600" err="1">
+                <a:solidFill>
+                  <a:schemeClr val="tx2"/>
+                </a:solidFill>
+              </a:rPr>
+              <a:t>çalışırken</a:t>
+            </a:r>
+            <a:r>
+              <a:rPr lang="en-US" sz="1600" dirty="0">
+                <a:solidFill>
+                  <a:schemeClr val="tx2"/>
+                </a:solidFill>
+              </a:rPr>
+              <a:t> </a:t>
+            </a:r>
+            <a:r>
+              <a:rPr lang="en-US" sz="1600" err="1">
+                <a:solidFill>
+                  <a:schemeClr val="tx2"/>
+                </a:solidFill>
+              </a:rPr>
+              <a:t>farklı</a:t>
+            </a:r>
+            <a:r>
+              <a:rPr lang="en-US" sz="1600" dirty="0">
+                <a:solidFill>
+                  <a:schemeClr val="tx2"/>
+                </a:solidFill>
+              </a:rPr>
+              <a:t> </a:t>
+            </a:r>
+            <a:r>
+              <a:rPr lang="en-US" sz="1600" err="1">
+                <a:solidFill>
+                  <a:schemeClr val="tx2"/>
+                </a:solidFill>
+              </a:rPr>
+              <a:t>bir</a:t>
+            </a:r>
+            <a:r>
+              <a:rPr lang="en-US" sz="1600" dirty="0">
+                <a:solidFill>
+                  <a:schemeClr val="tx2"/>
+                </a:solidFill>
+              </a:rPr>
+              <a:t> </a:t>
+            </a:r>
+            <a:r>
+              <a:rPr lang="en-US" sz="1600" err="1">
+                <a:solidFill>
+                  <a:schemeClr val="tx2"/>
+                </a:solidFill>
+              </a:rPr>
+              <a:t>yol</a:t>
+            </a:r>
+            <a:r>
+              <a:rPr lang="en-US" sz="1600" dirty="0">
+                <a:solidFill>
+                  <a:schemeClr val="tx2"/>
+                </a:solidFill>
+              </a:rPr>
+              <a:t> </a:t>
+            </a:r>
+            <a:r>
+              <a:rPr lang="en-US" sz="1600" err="1">
+                <a:solidFill>
+                  <a:schemeClr val="tx2"/>
+                </a:solidFill>
+              </a:rPr>
+              <a:t>izlemeyi</a:t>
+            </a:r>
+            <a:r>
+              <a:rPr lang="en-US" sz="1600" dirty="0">
+                <a:solidFill>
+                  <a:schemeClr val="tx2"/>
+                </a:solidFill>
+              </a:rPr>
+              <a:t> </a:t>
+            </a:r>
+            <a:r>
+              <a:rPr lang="en-US" sz="1600" err="1">
+                <a:solidFill>
+                  <a:schemeClr val="tx2"/>
+                </a:solidFill>
+              </a:rPr>
+              <a:t>düşünürsek</a:t>
+            </a:r>
+            <a:r>
+              <a:rPr lang="en-US" sz="1600" dirty="0">
+                <a:solidFill>
+                  <a:schemeClr val="tx2"/>
+                </a:solidFill>
+              </a:rPr>
+              <a:t> </a:t>
+            </a:r>
+            <a:r>
+              <a:rPr lang="en-US" sz="1600" err="1">
+                <a:solidFill>
+                  <a:schemeClr val="tx2"/>
+                </a:solidFill>
+              </a:rPr>
+              <a:t>gibi</a:t>
+            </a:r>
+            <a:r>
+              <a:rPr lang="en-US" sz="1600" dirty="0">
+                <a:solidFill>
+                  <a:schemeClr val="tx2"/>
+                </a:solidFill>
+              </a:rPr>
+              <a:t> </a:t>
+            </a:r>
+            <a:r>
+              <a:rPr lang="en-US" sz="1600" err="1">
+                <a:solidFill>
+                  <a:schemeClr val="tx2"/>
+                </a:solidFill>
+              </a:rPr>
+              <a:t>birçok</a:t>
+            </a:r>
+            <a:r>
+              <a:rPr lang="en-US" sz="1600" dirty="0">
+                <a:solidFill>
+                  <a:schemeClr val="tx2"/>
+                </a:solidFill>
+              </a:rPr>
+              <a:t> </a:t>
+            </a:r>
+            <a:r>
+              <a:rPr lang="en-US" sz="1600" err="1">
+                <a:solidFill>
+                  <a:schemeClr val="tx2"/>
+                </a:solidFill>
+              </a:rPr>
+              <a:t>sebepten</a:t>
+            </a:r>
+            <a:r>
+              <a:rPr lang="en-US" sz="1600" dirty="0">
+                <a:solidFill>
+                  <a:schemeClr val="tx2"/>
+                </a:solidFill>
+              </a:rPr>
+              <a:t> </a:t>
+            </a:r>
+            <a:r>
+              <a:rPr lang="en-US" sz="1600" err="1">
+                <a:solidFill>
+                  <a:schemeClr val="tx2"/>
+                </a:solidFill>
+              </a:rPr>
+              <a:t>dolayı</a:t>
+            </a:r>
+            <a:r>
+              <a:rPr lang="en-US" sz="1600" dirty="0">
+                <a:solidFill>
+                  <a:schemeClr val="tx2"/>
+                </a:solidFill>
+              </a:rPr>
+              <a:t> </a:t>
+            </a:r>
+            <a:r>
+              <a:rPr lang="en-US" sz="1600" err="1">
+                <a:solidFill>
+                  <a:schemeClr val="tx2"/>
+                </a:solidFill>
+              </a:rPr>
+              <a:t>branchlar</a:t>
+            </a:r>
+            <a:r>
+              <a:rPr lang="en-US" sz="1600" dirty="0">
+                <a:solidFill>
+                  <a:schemeClr val="tx2"/>
+                </a:solidFill>
+              </a:rPr>
+              <a:t> </a:t>
+            </a:r>
+            <a:r>
+              <a:rPr lang="en-US" sz="1600" err="1">
+                <a:solidFill>
+                  <a:schemeClr val="tx2"/>
+                </a:solidFill>
+              </a:rPr>
+              <a:t>açılabilir.Birden</a:t>
+            </a:r>
+            <a:r>
+              <a:rPr lang="en-US" sz="1600" dirty="0">
+                <a:solidFill>
+                  <a:schemeClr val="tx2"/>
+                </a:solidFill>
+              </a:rPr>
+              <a:t> </a:t>
+            </a:r>
+            <a:r>
+              <a:rPr lang="en-US" sz="1600" err="1">
+                <a:solidFill>
+                  <a:schemeClr val="tx2"/>
+                </a:solidFill>
+              </a:rPr>
+              <a:t>fazla</a:t>
+            </a:r>
+            <a:r>
+              <a:rPr lang="en-US" sz="1600" dirty="0">
+                <a:solidFill>
+                  <a:schemeClr val="tx2"/>
+                </a:solidFill>
+              </a:rPr>
+              <a:t> </a:t>
+            </a:r>
+            <a:r>
+              <a:rPr lang="en-US" sz="1600" err="1">
+                <a:solidFill>
+                  <a:schemeClr val="tx2"/>
+                </a:solidFill>
+              </a:rPr>
+              <a:t>kişi</a:t>
+            </a:r>
+            <a:r>
+              <a:rPr lang="en-US" sz="1600" dirty="0">
+                <a:solidFill>
+                  <a:schemeClr val="tx2"/>
+                </a:solidFill>
+              </a:rPr>
+              <a:t> </a:t>
+            </a:r>
+            <a:r>
+              <a:rPr lang="en-US" sz="1600" err="1">
+                <a:solidFill>
+                  <a:schemeClr val="tx2"/>
+                </a:solidFill>
+              </a:rPr>
+              <a:t>bir</a:t>
+            </a:r>
+            <a:r>
+              <a:rPr lang="en-US" sz="1600" dirty="0">
+                <a:solidFill>
+                  <a:schemeClr val="tx2"/>
+                </a:solidFill>
+              </a:rPr>
+              <a:t> </a:t>
+            </a:r>
+            <a:r>
+              <a:rPr lang="en-US" sz="1600" err="1">
+                <a:solidFill>
+                  <a:schemeClr val="tx2"/>
+                </a:solidFill>
+              </a:rPr>
+              <a:t>ortak</a:t>
+            </a:r>
+            <a:r>
+              <a:rPr lang="en-US" sz="1600" dirty="0">
+                <a:solidFill>
+                  <a:schemeClr val="tx2"/>
+                </a:solidFill>
+              </a:rPr>
+              <a:t> </a:t>
+            </a:r>
+            <a:r>
+              <a:rPr lang="en-US" sz="1600" err="1">
+                <a:solidFill>
+                  <a:schemeClr val="tx2"/>
+                </a:solidFill>
+              </a:rPr>
+              <a:t>proje</a:t>
+            </a:r>
+            <a:r>
+              <a:rPr lang="en-US" sz="1600" dirty="0">
+                <a:solidFill>
+                  <a:schemeClr val="tx2"/>
+                </a:solidFill>
+              </a:rPr>
+              <a:t> </a:t>
+            </a:r>
+            <a:r>
+              <a:rPr lang="en-US" sz="1600" err="1">
+                <a:solidFill>
+                  <a:schemeClr val="tx2"/>
+                </a:solidFill>
+              </a:rPr>
+              <a:t>üzerinde</a:t>
+            </a:r>
+            <a:r>
+              <a:rPr lang="en-US" sz="1600" dirty="0">
+                <a:solidFill>
+                  <a:schemeClr val="tx2"/>
+                </a:solidFill>
+              </a:rPr>
+              <a:t> </a:t>
+            </a:r>
+            <a:r>
+              <a:rPr lang="en-US" sz="1600" err="1">
+                <a:solidFill>
+                  <a:schemeClr val="tx2"/>
+                </a:solidFill>
+              </a:rPr>
+              <a:t>çalıştığı</a:t>
+            </a:r>
+            <a:r>
+              <a:rPr lang="en-US" sz="1600" dirty="0">
+                <a:solidFill>
+                  <a:schemeClr val="tx2"/>
+                </a:solidFill>
+              </a:rPr>
+              <a:t> zaman </a:t>
+            </a:r>
+            <a:r>
+              <a:rPr lang="en-US" sz="1600" err="1">
+                <a:solidFill>
+                  <a:schemeClr val="tx2"/>
+                </a:solidFill>
+              </a:rPr>
+              <a:t>herkesin</a:t>
+            </a:r>
+            <a:r>
+              <a:rPr lang="en-US" sz="1600" dirty="0">
+                <a:solidFill>
+                  <a:schemeClr val="tx2"/>
+                </a:solidFill>
+              </a:rPr>
+              <a:t> </a:t>
+            </a:r>
+            <a:r>
+              <a:rPr lang="en-US" sz="1600" err="1">
+                <a:solidFill>
+                  <a:schemeClr val="tx2"/>
+                </a:solidFill>
+              </a:rPr>
+              <a:t>farklı</a:t>
+            </a:r>
+            <a:r>
+              <a:rPr lang="en-US" sz="1600" dirty="0">
+                <a:solidFill>
+                  <a:schemeClr val="tx2"/>
+                </a:solidFill>
+              </a:rPr>
+              <a:t> branch </a:t>
+            </a:r>
+            <a:r>
+              <a:rPr lang="en-US" sz="1600" err="1">
+                <a:solidFill>
+                  <a:schemeClr val="tx2"/>
+                </a:solidFill>
+              </a:rPr>
+              <a:t>üzerinde</a:t>
+            </a:r>
+            <a:r>
+              <a:rPr lang="en-US" sz="1600" dirty="0">
+                <a:solidFill>
+                  <a:schemeClr val="tx2"/>
+                </a:solidFill>
+              </a:rPr>
+              <a:t> </a:t>
+            </a:r>
+            <a:r>
+              <a:rPr lang="en-US" sz="1600" err="1">
+                <a:solidFill>
+                  <a:schemeClr val="tx2"/>
+                </a:solidFill>
+              </a:rPr>
+              <a:t>çalışması</a:t>
+            </a:r>
+            <a:r>
+              <a:rPr lang="en-US" sz="1600" dirty="0">
+                <a:solidFill>
+                  <a:schemeClr val="tx2"/>
+                </a:solidFill>
+              </a:rPr>
+              <a:t> buna </a:t>
+            </a:r>
+            <a:r>
+              <a:rPr lang="en-US" sz="1600" err="1">
+                <a:solidFill>
+                  <a:schemeClr val="tx2"/>
+                </a:solidFill>
+              </a:rPr>
+              <a:t>bir</a:t>
+            </a:r>
+            <a:r>
+              <a:rPr lang="en-US" sz="1600" dirty="0">
+                <a:solidFill>
+                  <a:schemeClr val="tx2"/>
+                </a:solidFill>
+              </a:rPr>
+              <a:t> </a:t>
+            </a:r>
+            <a:r>
+              <a:rPr lang="en-US" sz="1600" err="1">
+                <a:solidFill>
+                  <a:schemeClr val="tx2"/>
+                </a:solidFill>
+              </a:rPr>
+              <a:t>örnek</a:t>
+            </a:r>
+            <a:r>
+              <a:rPr lang="en-US" sz="1600" dirty="0">
+                <a:solidFill>
+                  <a:schemeClr val="tx2"/>
+                </a:solidFill>
+              </a:rPr>
+              <a:t> </a:t>
+            </a:r>
+            <a:r>
+              <a:rPr lang="en-US" sz="1600" err="1">
+                <a:solidFill>
+                  <a:schemeClr val="tx2"/>
+                </a:solidFill>
+              </a:rPr>
+              <a:t>olabilir</a:t>
+            </a:r>
+            <a:r>
+              <a:rPr lang="en-US" sz="1600" dirty="0">
+                <a:solidFill>
+                  <a:schemeClr val="tx2"/>
+                </a:solidFill>
+              </a:rPr>
+              <a:t>. </a:t>
+            </a:r>
+            <a:endParaRPr lang="tr-TR" dirty="0"/>
+          </a:p>
+        </p:txBody>
+      </p:sp>
+      <p:sp>
+        <p:nvSpPr>
+          <p:cNvPr id="12" name="Freeform 6">
+            <a:extLst>
+              <a:ext uri="{FF2B5EF4-FFF2-40B4-BE49-F238E27FC236}">
+                <a16:creationId xmlns:a16="http://schemas.microsoft.com/office/drawing/2014/main" id="{CC1026F7-DECB-49B4-A565-518BBA445471}"/>
+              </a:ext>
+              <a:ext uri="{C183D7F6-B498-43B3-948B-1728B52AA6E4}">
+                <adec:decorative xmlns:adec="http://schemas.microsoft.com/office/drawing/2017/decorative" val="1"/>
+              </a:ext>
+            </a:extLst>
+          </p:cNvPr>
+          <p:cNvSpPr>
+            <a:spLocks noGrp="1" noRot="1" noChangeAspect="1" noMove="1" noResize="1" noEditPoints="1" noAdjustHandles="1" noChangeArrowheads="1" noChangeShapeType="1" noTextEdit="1"/>
+          </p:cNvSpPr>
+          <p:nvPr>
+            <p:extLst>
+              <p:ext uri="{386F3935-93C4-4BCD-93E2-E3B085C9AB24}">
+                <p16:designElem xmlns:p16="http://schemas.microsoft.com/office/powerpoint/2015/main" val="1"/>
+              </p:ext>
+            </p:extLst>
+          </p:nvPr>
+        </p:nvSpPr>
+        <p:spPr bwMode="auto">
+          <a:xfrm flipH="1" flipV="1">
+            <a:off x="7983434" y="640080"/>
+            <a:ext cx="2296028" cy="3674981"/>
+          </a:xfrm>
+          <a:custGeom>
+            <a:avLst/>
+            <a:gdLst/>
+            <a:ahLst/>
+            <a:cxnLst/>
+            <a:rect l="l" t="t" r="r" b="b"/>
+            <a:pathLst>
+              <a:path w="10002" h="10000">
+                <a:moveTo>
+                  <a:pt x="8763" y="0"/>
+                </a:moveTo>
+                <a:lnTo>
+                  <a:pt x="10002" y="0"/>
+                </a:lnTo>
+                <a:lnTo>
+                  <a:pt x="10002" y="10000"/>
+                </a:lnTo>
+                <a:lnTo>
+                  <a:pt x="2" y="10000"/>
+                </a:lnTo>
+                <a:cubicBezTo>
+                  <a:pt x="-2" y="9698"/>
+                  <a:pt x="4" y="9427"/>
+                  <a:pt x="0" y="9125"/>
+                </a:cubicBezTo>
+                <a:lnTo>
+                  <a:pt x="8763" y="9128"/>
+                </a:lnTo>
+                <a:lnTo>
+                  <a:pt x="8763" y="0"/>
+                </a:lnTo>
+                <a:close/>
+              </a:path>
+            </a:pathLst>
+          </a:custGeom>
+          <a:solidFill>
+            <a:schemeClr val="tx2"/>
+          </a:solidFill>
+          <a:ln w="0">
+            <a:noFill/>
+            <a:prstDash val="solid"/>
+            <a:round/>
+            <a:headEnd/>
+            <a:tailEnd/>
+          </a:ln>
+        </p:spPr>
+      </p:sp>
+      <p:sp>
+        <p:nvSpPr>
+          <p:cNvPr id="6" name="Metin kutusu 5">
+            <a:extLst>
+              <a:ext uri="{FF2B5EF4-FFF2-40B4-BE49-F238E27FC236}">
+                <a16:creationId xmlns:a16="http://schemas.microsoft.com/office/drawing/2014/main" id="{C0F86617-E6AA-2034-9E83-2C5CCD5B4274}"/>
+              </a:ext>
+            </a:extLst>
+          </p:cNvPr>
+          <p:cNvSpPr txBox="1"/>
+          <p:nvPr/>
+        </p:nvSpPr>
+        <p:spPr>
+          <a:xfrm>
+            <a:off x="631031" y="4964906"/>
+            <a:ext cx="10894217" cy="1785104"/>
+          </a:xfrm>
+          <a:prstGeom prst="rect">
+            <a:avLst/>
+          </a:prstGeom>
+          <a:noFill/>
+        </p:spPr>
+        <p:txBody>
+          <a:bodyPr rot="0" spcFirstLastPara="0" vertOverflow="overflow" horzOverflow="overflow" vert="horz" wrap="square" lIns="91440" tIns="45720" rIns="91440" bIns="45720" numCol="1" spcCol="0" rtlCol="0" fromWordArt="0" anchor="t" anchorCtr="0" forceAA="0" compatLnSpc="1">
+            <a:prstTxWarp prst="textNoShape">
+              <a:avLst/>
+            </a:prstTxWarp>
+            <a:spAutoFit/>
+          </a:bodyPr>
+          <a:lstStyle/>
+          <a:p>
+            <a:r>
+              <a:rPr lang="tr-TR" sz="2000" b="1" dirty="0"/>
+              <a:t>Bazı Örnek </a:t>
+            </a:r>
+            <a:r>
+              <a:rPr lang="tr-TR" sz="2000" b="1" err="1"/>
+              <a:t>Branch</a:t>
+            </a:r>
+            <a:r>
+              <a:rPr lang="tr-TR" sz="2000" b="1" dirty="0"/>
+              <a:t> Komutları:</a:t>
+            </a:r>
+          </a:p>
+          <a:p>
+            <a:r>
+              <a:rPr lang="tr-TR" dirty="0"/>
+              <a:t>Git </a:t>
+            </a:r>
+            <a:r>
+              <a:rPr lang="tr-TR" dirty="0" err="1"/>
+              <a:t>branch</a:t>
+            </a:r>
+            <a:r>
+              <a:rPr lang="tr-TR" dirty="0"/>
+              <a:t> = Güncel </a:t>
+            </a:r>
+            <a:r>
+              <a:rPr lang="tr-TR" dirty="0" err="1"/>
+              <a:t>branchleri</a:t>
+            </a:r>
+            <a:r>
+              <a:rPr lang="tr-TR" dirty="0"/>
+              <a:t> gösterir.</a:t>
+            </a:r>
             <a:endParaRPr lang="tr-TR"/>
+          </a:p>
+          <a:p>
+            <a:r>
+              <a:rPr lang="tr-TR" dirty="0"/>
+              <a:t>Git </a:t>
+            </a:r>
+            <a:r>
+              <a:rPr lang="tr-TR" err="1"/>
+              <a:t>branch</a:t>
+            </a:r>
+            <a:r>
+              <a:rPr lang="tr-TR" dirty="0"/>
+              <a:t> </a:t>
+            </a:r>
+            <a:r>
+              <a:rPr lang="tr-TR" err="1"/>
+              <a:t>branchadı</a:t>
+            </a:r>
+            <a:r>
+              <a:rPr lang="tr-TR" dirty="0"/>
+              <a:t> = Yeni bir </a:t>
+            </a:r>
+            <a:r>
+              <a:rPr lang="tr-TR" err="1"/>
+              <a:t>branch</a:t>
+            </a:r>
+            <a:r>
+              <a:rPr lang="tr-TR" dirty="0"/>
+              <a:t> oluşturur.</a:t>
+            </a:r>
+          </a:p>
+          <a:p>
+            <a:r>
+              <a:rPr lang="tr-TR" dirty="0"/>
+              <a:t>Git </a:t>
+            </a:r>
+            <a:r>
+              <a:rPr lang="tr-TR" dirty="0" err="1"/>
+              <a:t>switch</a:t>
+            </a:r>
+            <a:r>
+              <a:rPr lang="tr-TR" dirty="0"/>
+              <a:t> = Farklı bir </a:t>
+            </a:r>
+            <a:r>
+              <a:rPr lang="tr-TR" dirty="0" err="1"/>
+              <a:t>branche</a:t>
+            </a:r>
+            <a:r>
+              <a:rPr lang="tr-TR" dirty="0"/>
+              <a:t> geçmeni sağlar.</a:t>
+            </a:r>
+          </a:p>
+          <a:p>
+            <a:r>
+              <a:rPr lang="tr-TR" dirty="0"/>
+              <a:t>Git </a:t>
+            </a:r>
+            <a:r>
+              <a:rPr lang="tr-TR" err="1"/>
+              <a:t>merge</a:t>
+            </a:r>
+            <a:r>
+              <a:rPr lang="tr-TR" dirty="0"/>
+              <a:t> = </a:t>
+            </a:r>
+            <a:r>
+              <a:rPr lang="tr-TR" err="1"/>
+              <a:t>Branchleri</a:t>
+            </a:r>
+            <a:r>
+              <a:rPr lang="tr-TR" dirty="0"/>
+              <a:t> birleştirir.</a:t>
+            </a:r>
+          </a:p>
+          <a:p>
+            <a:r>
+              <a:rPr lang="tr-TR" dirty="0">
+                <a:ea typeface="+mn-lt"/>
+                <a:cs typeface="+mn-lt"/>
+              </a:rPr>
+              <a:t>Git </a:t>
+            </a:r>
+            <a:r>
+              <a:rPr lang="tr-TR" dirty="0" err="1">
+                <a:ea typeface="+mn-lt"/>
+                <a:cs typeface="+mn-lt"/>
+              </a:rPr>
+              <a:t>checkout</a:t>
+            </a:r>
+            <a:r>
+              <a:rPr lang="tr-TR" dirty="0">
+                <a:ea typeface="+mn-lt"/>
+                <a:cs typeface="+mn-lt"/>
+              </a:rPr>
+              <a:t> = Git </a:t>
+            </a:r>
+            <a:r>
+              <a:rPr lang="tr-TR" dirty="0" err="1">
+                <a:ea typeface="+mn-lt"/>
+                <a:cs typeface="+mn-lt"/>
+              </a:rPr>
+              <a:t>brachin</a:t>
+            </a:r>
+            <a:r>
+              <a:rPr lang="tr-TR" dirty="0">
+                <a:ea typeface="+mn-lt"/>
+                <a:cs typeface="+mn-lt"/>
+              </a:rPr>
+              <a:t> işlevlerini yapar ama bunun yeni bir </a:t>
+            </a:r>
+            <a:r>
+              <a:rPr lang="tr-TR" dirty="0" err="1">
+                <a:ea typeface="+mn-lt"/>
+                <a:cs typeface="+mn-lt"/>
+              </a:rPr>
+              <a:t>branch</a:t>
+            </a:r>
+            <a:r>
+              <a:rPr lang="tr-TR" dirty="0">
+                <a:ea typeface="+mn-lt"/>
+                <a:cs typeface="+mn-lt"/>
+              </a:rPr>
+              <a:t> açtığın zaman direk onun içine girersin.</a:t>
+            </a:r>
+            <a:endParaRPr lang="tr-TR" dirty="0"/>
           </a:p>
         </p:txBody>
       </p:sp>

</xml_diff>

<commit_message>
Github başlığı ve ilk sayfası eklendi
</commit_message>
<xml_diff>
--- a/Gitsunum.pptx
+++ b/Gitsunum.pptx
@@ -9,6 +9,7 @@
     <p:sldId id="257" r:id="rId3"/>
     <p:sldId id="258" r:id="rId4"/>
     <p:sldId id="259" r:id="rId5"/>
+    <p:sldId id="260" r:id="rId6"/>
   </p:sldIdLst>
   <p:sldSz cx="12192000" cy="6858000"/>
   <p:notesSz cx="6858000" cy="9144000"/>
@@ -120,7 +121,7 @@
   <p1510:revLst>
     <p1510:client id="{08D64386-19A3-6B06-AD19-AA732D24D73D}" v="11" dt="2025-03-07T10:18:55.338"/>
     <p1510:client id="{220426D4-292A-19F7-1104-2898146CA523}" v="1" dt="2025-03-07T09:52:54.804"/>
-    <p1510:client id="{A123BB24-4108-EFFD-8D12-5C3EE2CA58CD}" v="1435" dt="2025-03-07T11:52:40.283"/>
+    <p1510:client id="{A123BB24-4108-EFFD-8D12-5C3EE2CA58CD}" v="1626" dt="2025-03-07T12:19:37.859"/>
     <p1510:client id="{CEF14E3E-4315-2E37-2315-E7B5AC358147}" v="125" dt="2025-03-07T10:30:54.841"/>
   </p1510:revLst>
 </p1510:revInfo>
@@ -147,16 +148,24 @@
   <pc:docChgLst>
     <pc:chgData name="beren sarı" userId="ee17b9781157bf7b" providerId="Windows Live" clId="Web-{A123BB24-4108-EFFD-8D12-5C3EE2CA58CD}"/>
     <pc:docChg chg="addSld modSld">
-      <pc:chgData name="beren sarı" userId="ee17b9781157bf7b" providerId="Windows Live" clId="Web-{A123BB24-4108-EFFD-8D12-5C3EE2CA58CD}" dt="2025-03-07T11:52:40.283" v="927" actId="20577"/>
+      <pc:chgData name="beren sarı" userId="ee17b9781157bf7b" providerId="Windows Live" clId="Web-{A123BB24-4108-EFFD-8D12-5C3EE2CA58CD}" dt="2025-03-07T12:19:37.859" v="1042" actId="1076"/>
       <pc:docMkLst>
         <pc:docMk/>
       </pc:docMkLst>
       <pc:sldChg chg="modSp">
-        <pc:chgData name="beren sarı" userId="ee17b9781157bf7b" providerId="Windows Live" clId="Web-{A123BB24-4108-EFFD-8D12-5C3EE2CA58CD}" dt="2025-03-07T11:14:19.280" v="385" actId="20577"/>
+        <pc:chgData name="beren sarı" userId="ee17b9781157bf7b" providerId="Windows Live" clId="Web-{A123BB24-4108-EFFD-8D12-5C3EE2CA58CD}" dt="2025-03-07T12:15:21.695" v="937" actId="20577"/>
         <pc:sldMkLst>
           <pc:docMk/>
           <pc:sldMk cId="42641949" sldId="257"/>
         </pc:sldMkLst>
+        <pc:spChg chg="mod">
+          <ac:chgData name="beren sarı" userId="ee17b9781157bf7b" providerId="Windows Live" clId="Web-{A123BB24-4108-EFFD-8D12-5C3EE2CA58CD}" dt="2025-03-07T12:15:21.695" v="937" actId="20577"/>
+          <ac:spMkLst>
+            <pc:docMk/>
+            <pc:sldMk cId="42641949" sldId="257"/>
+            <ac:spMk id="2" creationId="{B40DA49B-939E-FCB5-CC0C-EBF9AF79B527}"/>
+          </ac:spMkLst>
+        </pc:spChg>
         <pc:spChg chg="mod">
           <ac:chgData name="beren sarı" userId="ee17b9781157bf7b" providerId="Windows Live" clId="Web-{A123BB24-4108-EFFD-8D12-5C3EE2CA58CD}" dt="2025-03-07T11:14:19.280" v="385" actId="20577"/>
           <ac:spMkLst>
@@ -167,13 +176,13 @@
         </pc:spChg>
       </pc:sldChg>
       <pc:sldChg chg="modSp new">
-        <pc:chgData name="beren sarı" userId="ee17b9781157bf7b" providerId="Windows Live" clId="Web-{A123BB24-4108-EFFD-8D12-5C3EE2CA58CD}" dt="2025-03-07T11:52:40.283" v="927" actId="20577"/>
+        <pc:chgData name="beren sarı" userId="ee17b9781157bf7b" providerId="Windows Live" clId="Web-{A123BB24-4108-EFFD-8D12-5C3EE2CA58CD}" dt="2025-03-07T12:15:18.336" v="936" actId="20577"/>
         <pc:sldMkLst>
           <pc:docMk/>
           <pc:sldMk cId="3217141839" sldId="258"/>
         </pc:sldMkLst>
         <pc:spChg chg="mod">
-          <ac:chgData name="beren sarı" userId="ee17b9781157bf7b" providerId="Windows Live" clId="Web-{A123BB24-4108-EFFD-8D12-5C3EE2CA58CD}" dt="2025-03-07T11:04:59.493" v="3" actId="20577"/>
+          <ac:chgData name="beren sarı" userId="ee17b9781157bf7b" providerId="Windows Live" clId="Web-{A123BB24-4108-EFFD-8D12-5C3EE2CA58CD}" dt="2025-03-07T12:15:18.336" v="936" actId="20577"/>
           <ac:spMkLst>
             <pc:docMk/>
             <pc:sldMk cId="3217141839" sldId="258"/>
@@ -251,6 +260,45 @@
             <ac:picMk id="4" creationId="{8774CAE7-ABCE-DD56-B854-949429455FA6}"/>
           </ac:picMkLst>
         </pc:picChg>
+      </pc:sldChg>
+      <pc:sldChg chg="addSp modSp new">
+        <pc:chgData name="beren sarı" userId="ee17b9781157bf7b" providerId="Windows Live" clId="Web-{A123BB24-4108-EFFD-8D12-5C3EE2CA58CD}" dt="2025-03-07T12:19:37.859" v="1042" actId="1076"/>
+        <pc:sldMkLst>
+          <pc:docMk/>
+          <pc:sldMk cId="2231968515" sldId="260"/>
+        </pc:sldMkLst>
+        <pc:spChg chg="mod">
+          <ac:chgData name="beren sarı" userId="ee17b9781157bf7b" providerId="Windows Live" clId="Web-{A123BB24-4108-EFFD-8D12-5C3EE2CA58CD}" dt="2025-03-07T12:19:29.062" v="1040" actId="1076"/>
+          <ac:spMkLst>
+            <pc:docMk/>
+            <pc:sldMk cId="2231968515" sldId="260"/>
+            <ac:spMk id="2" creationId="{EBD7CFA6-28B2-D0DF-E753-38A3C1494417}"/>
+          </ac:spMkLst>
+        </pc:spChg>
+        <pc:spChg chg="mod">
+          <ac:chgData name="beren sarı" userId="ee17b9781157bf7b" providerId="Windows Live" clId="Web-{A123BB24-4108-EFFD-8D12-5C3EE2CA58CD}" dt="2025-03-07T12:16:33.494" v="956" actId="20577"/>
+          <ac:spMkLst>
+            <pc:docMk/>
+            <pc:sldMk cId="2231968515" sldId="260"/>
+            <ac:spMk id="3" creationId="{A8B87A51-0502-ED67-50D4-4026EF18D58B}"/>
+          </ac:spMkLst>
+        </pc:spChg>
+        <pc:spChg chg="add mod">
+          <ac:chgData name="beren sarı" userId="ee17b9781157bf7b" providerId="Windows Live" clId="Web-{A123BB24-4108-EFFD-8D12-5C3EE2CA58CD}" dt="2025-03-07T12:19:31.390" v="1041" actId="1076"/>
+          <ac:spMkLst>
+            <pc:docMk/>
+            <pc:sldMk cId="2231968515" sldId="260"/>
+            <ac:spMk id="4" creationId="{8B24AC0C-C6B5-5DFF-7153-71266622CEEC}"/>
+          </ac:spMkLst>
+        </pc:spChg>
+        <pc:spChg chg="add mod">
+          <ac:chgData name="beren sarı" userId="ee17b9781157bf7b" providerId="Windows Live" clId="Web-{A123BB24-4108-EFFD-8D12-5C3EE2CA58CD}" dt="2025-03-07T12:19:37.859" v="1042" actId="1076"/>
+          <ac:spMkLst>
+            <pc:docMk/>
+            <pc:sldMk cId="2231968515" sldId="260"/>
+            <ac:spMk id="5" creationId="{78DD4D83-D3C8-3B6C-0EA9-0EBA1A7CE086}"/>
+          </ac:spMkLst>
+        </pc:spChg>
       </pc:sldChg>
     </pc:docChg>
   </pc:docChgLst>
@@ -4140,7 +4188,7 @@
           <a:lstStyle/>
           <a:p>
             <a:r>
-              <a:rPr lang="tr-TR"/>
+              <a:rPr lang="tr-TR" b="1" dirty="0"/>
               <a:t>Git</a:t>
             </a:r>
           </a:p>
@@ -4357,11 +4405,11 @@
           <a:lstStyle/>
           <a:p>
             <a:r>
-              <a:rPr lang="tr-TR" dirty="0" err="1"/>
+              <a:rPr lang="tr-TR" b="1" dirty="0" err="1"/>
               <a:t>Commit</a:t>
             </a:r>
             <a:r>
-              <a:rPr lang="tr-TR" dirty="0"/>
+              <a:rPr lang="tr-TR" b="1" dirty="0"/>
               <a:t> </a:t>
             </a:r>
           </a:p>
@@ -5647,6 +5695,295 @@
     <p:extLst>
       <p:ext uri="{BB962C8B-B14F-4D97-AF65-F5344CB8AC3E}">
         <p14:creationId xmlns:p14="http://schemas.microsoft.com/office/powerpoint/2010/main" val="3785688334"/>
+      </p:ext>
+    </p:extLst>
+  </p:cSld>
+  <p:clrMapOvr>
+    <a:masterClrMapping/>
+  </p:clrMapOvr>
+</p:sld>
+</file>
+
+<file path=ppt/slides/slide5.xml><?xml version="1.0" encoding="utf-8"?>
+<p:sld xmlns:a="http://schemas.openxmlformats.org/drawingml/2006/main" xmlns:r="http://schemas.openxmlformats.org/officeDocument/2006/relationships" xmlns:p="http://schemas.openxmlformats.org/presentationml/2006/main">
+  <p:cSld>
+    <p:spTree>
+      <p:nvGrpSpPr>
+        <p:cNvPr id="1" name=""/>
+        <p:cNvGrpSpPr/>
+        <p:nvPr/>
+      </p:nvGrpSpPr>
+      <p:grpSpPr>
+        <a:xfrm>
+          <a:off x="0" y="0"/>
+          <a:ext cx="0" cy="0"/>
+          <a:chOff x="0" y="0"/>
+          <a:chExt cx="0" cy="0"/>
+        </a:xfrm>
+      </p:grpSpPr>
+      <p:sp>
+        <p:nvSpPr>
+          <p:cNvPr id="2" name="Başlık 1">
+            <a:extLst>
+              <a:ext uri="{FF2B5EF4-FFF2-40B4-BE49-F238E27FC236}">
+                <a16:creationId xmlns:a16="http://schemas.microsoft.com/office/drawing/2014/main" id="{EBD7CFA6-28B2-D0DF-E753-38A3C1494417}"/>
+              </a:ext>
+            </a:extLst>
+          </p:cNvPr>
+          <p:cNvSpPr>
+            <a:spLocks noGrp="1"/>
+          </p:cNvSpPr>
+          <p:nvPr>
+            <p:ph type="title"/>
+          </p:nvPr>
+        </p:nvSpPr>
+        <p:spPr>
+          <a:xfrm>
+            <a:off x="1371600" y="660115"/>
+            <a:ext cx="9601200" cy="1485900"/>
+          </a:xfrm>
+        </p:spPr>
+        <p:txBody>
+          <a:bodyPr/>
+          <a:lstStyle/>
+          <a:p>
+            <a:r>
+              <a:rPr lang="tr-TR" b="1" err="1"/>
+              <a:t>Fast</a:t>
+            </a:r>
+            <a:r>
+              <a:rPr lang="tr-TR" b="1" dirty="0"/>
+              <a:t> </a:t>
+            </a:r>
+            <a:r>
+              <a:rPr lang="tr-TR" b="1" err="1"/>
+              <a:t>Forward</a:t>
+            </a:r>
+            <a:endParaRPr lang="tr-TR" b="1"/>
+          </a:p>
+        </p:txBody>
+      </p:sp>
+      <p:sp>
+        <p:nvSpPr>
+          <p:cNvPr id="3" name="İçerik Yer Tutucusu 2">
+            <a:extLst>
+              <a:ext uri="{FF2B5EF4-FFF2-40B4-BE49-F238E27FC236}">
+                <a16:creationId xmlns:a16="http://schemas.microsoft.com/office/drawing/2014/main" id="{A8B87A51-0502-ED67-50D4-4026EF18D58B}"/>
+              </a:ext>
+            </a:extLst>
+          </p:cNvPr>
+          <p:cNvSpPr>
+            <a:spLocks noGrp="1"/>
+          </p:cNvSpPr>
+          <p:nvPr>
+            <p:ph idx="1"/>
+          </p:nvPr>
+        </p:nvSpPr>
+        <p:spPr>
+          <a:xfrm>
+            <a:off x="1371600" y="1710906"/>
+            <a:ext cx="9601200" cy="1137250"/>
+          </a:xfrm>
+        </p:spPr>
+        <p:txBody>
+          <a:bodyPr vert="horz" lIns="91440" tIns="45720" rIns="91440" bIns="45720" rtlCol="0" anchor="t">
+            <a:normAutofit/>
+          </a:bodyPr>
+          <a:lstStyle/>
+          <a:p>
+            <a:pPr marL="383540" indent="-383540"/>
+            <a:r>
+              <a:rPr lang="tr-TR" sz="2400" dirty="0">
+                <a:ea typeface="+mn-lt"/>
+                <a:cs typeface="+mn-lt"/>
+              </a:rPr>
+              <a:t>İki farklı </a:t>
+            </a:r>
+            <a:r>
+              <a:rPr lang="tr-TR" sz="2400" dirty="0" err="1">
+                <a:ea typeface="+mn-lt"/>
+                <a:cs typeface="+mn-lt"/>
+              </a:rPr>
+              <a:t>branche</a:t>
+            </a:r>
+            <a:r>
+              <a:rPr lang="tr-TR" sz="2400" dirty="0">
+                <a:ea typeface="+mn-lt"/>
+                <a:cs typeface="+mn-lt"/>
+              </a:rPr>
+              <a:t> ayrıldıktan sonra ana daldan ayrılan </a:t>
+            </a:r>
+            <a:r>
+              <a:rPr lang="tr-TR" sz="2400" dirty="0" err="1">
+                <a:ea typeface="+mn-lt"/>
+                <a:cs typeface="+mn-lt"/>
+              </a:rPr>
+              <a:t>branchten</a:t>
+            </a:r>
+            <a:r>
+              <a:rPr lang="tr-TR" sz="2400" dirty="0">
+                <a:ea typeface="+mn-lt"/>
+                <a:cs typeface="+mn-lt"/>
+              </a:rPr>
+              <a:t> işlem yapmaya devam edip ana </a:t>
+            </a:r>
+            <a:r>
+              <a:rPr lang="tr-TR" sz="2400" dirty="0" err="1">
+                <a:ea typeface="+mn-lt"/>
+                <a:cs typeface="+mn-lt"/>
+              </a:rPr>
+              <a:t>branch</a:t>
+            </a:r>
+            <a:r>
+              <a:rPr lang="tr-TR" sz="2400" dirty="0">
+                <a:ea typeface="+mn-lt"/>
+                <a:cs typeface="+mn-lt"/>
+              </a:rPr>
+              <a:t> üzerinde işlem yapılmamasından sonra ayrılan </a:t>
+            </a:r>
+            <a:r>
+              <a:rPr lang="tr-TR" sz="2400" dirty="0" err="1">
+                <a:ea typeface="+mn-lt"/>
+                <a:cs typeface="+mn-lt"/>
+              </a:rPr>
+              <a:t>branchın</a:t>
+            </a:r>
+            <a:r>
+              <a:rPr lang="tr-TR" sz="2400" dirty="0">
+                <a:ea typeface="+mn-lt"/>
+                <a:cs typeface="+mn-lt"/>
+              </a:rPr>
+              <a:t> </a:t>
+            </a:r>
+            <a:r>
+              <a:rPr lang="tr-TR" sz="2400" dirty="0" err="1">
+                <a:ea typeface="+mn-lt"/>
+                <a:cs typeface="+mn-lt"/>
+              </a:rPr>
+              <a:t>commitlerini</a:t>
+            </a:r>
+            <a:r>
+              <a:rPr lang="tr-TR" sz="2400" dirty="0">
+                <a:ea typeface="+mn-lt"/>
+                <a:cs typeface="+mn-lt"/>
+              </a:rPr>
+              <a:t> ilk </a:t>
+            </a:r>
+            <a:r>
+              <a:rPr lang="tr-TR" sz="2400" dirty="0" err="1">
+                <a:ea typeface="+mn-lt"/>
+                <a:cs typeface="+mn-lt"/>
+              </a:rPr>
+              <a:t>branchın</a:t>
+            </a:r>
+            <a:r>
+              <a:rPr lang="tr-TR" sz="2400" dirty="0">
+                <a:ea typeface="+mn-lt"/>
+                <a:cs typeface="+mn-lt"/>
+              </a:rPr>
+              <a:t> üstünde toplamak.</a:t>
+            </a:r>
+            <a:endParaRPr lang="tr-TR" sz="2400" dirty="0"/>
+          </a:p>
+        </p:txBody>
+      </p:sp>
+      <p:sp>
+        <p:nvSpPr>
+          <p:cNvPr id="4" name="Metin kutusu 3">
+            <a:extLst>
+              <a:ext uri="{FF2B5EF4-FFF2-40B4-BE49-F238E27FC236}">
+                <a16:creationId xmlns:a16="http://schemas.microsoft.com/office/drawing/2014/main" id="{8B24AC0C-C6B5-5DFF-7153-71266622CEEC}"/>
+              </a:ext>
+            </a:extLst>
+          </p:cNvPr>
+          <p:cNvSpPr txBox="1"/>
+          <p:nvPr/>
+        </p:nvSpPr>
+        <p:spPr>
+          <a:xfrm>
+            <a:off x="1369498" y="3238499"/>
+            <a:ext cx="3743994" cy="769441"/>
+          </a:xfrm>
+          <a:prstGeom prst="rect">
+            <a:avLst/>
+          </a:prstGeom>
+          <a:noFill/>
+        </p:spPr>
+        <p:txBody>
+          <a:bodyPr rot="0" spcFirstLastPara="0" vertOverflow="overflow" horzOverflow="overflow" vert="horz" wrap="square" lIns="91440" tIns="45720" rIns="91440" bIns="45720" numCol="1" spcCol="0" rtlCol="0" fromWordArt="0" anchor="t" anchorCtr="0" forceAA="0" compatLnSpc="1">
+            <a:prstTxWarp prst="textNoShape">
+              <a:avLst/>
+            </a:prstTxWarp>
+            <a:spAutoFit/>
+          </a:bodyPr>
+          <a:lstStyle/>
+          <a:p>
+            <a:r>
+              <a:rPr lang="tr-TR" sz="4400" b="1" dirty="0" err="1"/>
+              <a:t>Merge</a:t>
+            </a:r>
+            <a:r>
+              <a:rPr lang="tr-TR" sz="4400" b="1" dirty="0"/>
+              <a:t> </a:t>
+            </a:r>
+            <a:r>
+              <a:rPr lang="tr-TR" sz="4400" b="1" dirty="0" err="1"/>
+              <a:t>Conflict</a:t>
+            </a:r>
+            <a:endParaRPr lang="tr-TR" sz="4400" b="1" dirty="0"/>
+          </a:p>
+        </p:txBody>
+      </p:sp>
+      <p:sp>
+        <p:nvSpPr>
+          <p:cNvPr id="5" name="Metin kutusu 4">
+            <a:extLst>
+              <a:ext uri="{FF2B5EF4-FFF2-40B4-BE49-F238E27FC236}">
+                <a16:creationId xmlns:a16="http://schemas.microsoft.com/office/drawing/2014/main" id="{78DD4D83-D3C8-3B6C-0EA9-0EBA1A7CE086}"/>
+              </a:ext>
+            </a:extLst>
+          </p:cNvPr>
+          <p:cNvSpPr txBox="1"/>
+          <p:nvPr/>
+        </p:nvSpPr>
+        <p:spPr>
+          <a:xfrm>
+            <a:off x="1369109" y="4433649"/>
+            <a:ext cx="9594272" cy="830997"/>
+          </a:xfrm>
+          <a:prstGeom prst="rect">
+            <a:avLst/>
+          </a:prstGeom>
+          <a:noFill/>
+        </p:spPr>
+        <p:txBody>
+          <a:bodyPr rot="0" spcFirstLastPara="0" vertOverflow="overflow" horzOverflow="overflow" vert="horz" wrap="square" lIns="91440" tIns="45720" rIns="91440" bIns="45720" numCol="1" spcCol="0" rtlCol="0" fromWordArt="0" anchor="t" anchorCtr="0" forceAA="0" compatLnSpc="1">
+            <a:prstTxWarp prst="textNoShape">
+              <a:avLst/>
+            </a:prstTxWarp>
+            <a:spAutoFit/>
+          </a:bodyPr>
+          <a:lstStyle/>
+          <a:p>
+            <a:r>
+              <a:rPr lang="tr-TR" sz="2400" dirty="0"/>
+              <a:t>Bir projede çalışan iki kişinin aynı kısımda değişiklik yapması sonucu projeyi </a:t>
+            </a:r>
+            <a:r>
+              <a:rPr lang="tr-TR" sz="2400" dirty="0" err="1"/>
+              <a:t>merge</a:t>
+            </a:r>
+            <a:r>
+              <a:rPr lang="tr-TR" sz="2400" dirty="0"/>
+              <a:t> ederken oluşan sorun.</a:t>
+            </a:r>
+          </a:p>
+        </p:txBody>
+      </p:sp>
+    </p:spTree>
+    <p:extLst>
+      <p:ext uri="{BB962C8B-B14F-4D97-AF65-F5344CB8AC3E}">
+        <p14:creationId xmlns:p14="http://schemas.microsoft.com/office/powerpoint/2010/main" val="2231968515"/>
       </p:ext>
     </p:extLst>
   </p:cSld>

</xml_diff>

<commit_message>
Fork ve Pull Request terimleri eklendi
</commit_message>
<xml_diff>
--- a/Gitsunum.pptx
+++ b/Gitsunum.pptx
@@ -10,6 +10,7 @@
     <p:sldId id="258" r:id="rId4"/>
     <p:sldId id="259" r:id="rId5"/>
     <p:sldId id="260" r:id="rId6"/>
+    <p:sldId id="261" r:id="rId7"/>
   </p:sldIdLst>
   <p:sldSz cx="12192000" cy="6858000"/>
   <p:notesSz cx="6858000" cy="9144000"/>
@@ -121,7 +122,7 @@
   <p1510:revLst>
     <p1510:client id="{08D64386-19A3-6B06-AD19-AA732D24D73D}" v="11" dt="2025-03-07T10:18:55.338"/>
     <p1510:client id="{220426D4-292A-19F7-1104-2898146CA523}" v="1" dt="2025-03-07T09:52:54.804"/>
-    <p1510:client id="{A123BB24-4108-EFFD-8D12-5C3EE2CA58CD}" v="1626" dt="2025-03-07T12:19:37.859"/>
+    <p1510:client id="{A123BB24-4108-EFFD-8D12-5C3EE2CA58CD}" v="1965" dt="2025-03-07T12:27:39.795"/>
     <p1510:client id="{CEF14E3E-4315-2E37-2315-E7B5AC358147}" v="125" dt="2025-03-07T10:30:54.841"/>
   </p1510:revLst>
 </p1510:revInfo>
@@ -148,7 +149,7 @@
   <pc:docChgLst>
     <pc:chgData name="beren sarı" userId="ee17b9781157bf7b" providerId="Windows Live" clId="Web-{A123BB24-4108-EFFD-8D12-5C3EE2CA58CD}"/>
     <pc:docChg chg="addSld modSld">
-      <pc:chgData name="beren sarı" userId="ee17b9781157bf7b" providerId="Windows Live" clId="Web-{A123BB24-4108-EFFD-8D12-5C3EE2CA58CD}" dt="2025-03-07T12:19:37.859" v="1042" actId="1076"/>
+      <pc:chgData name="beren sarı" userId="ee17b9781157bf7b" providerId="Windows Live" clId="Web-{A123BB24-4108-EFFD-8D12-5C3EE2CA58CD}" dt="2025-03-07T12:27:39.795" v="1308" actId="1076"/>
       <pc:docMkLst>
         <pc:docMk/>
       </pc:docMkLst>
@@ -176,7 +177,7 @@
         </pc:spChg>
       </pc:sldChg>
       <pc:sldChg chg="modSp new">
-        <pc:chgData name="beren sarı" userId="ee17b9781157bf7b" providerId="Windows Live" clId="Web-{A123BB24-4108-EFFD-8D12-5C3EE2CA58CD}" dt="2025-03-07T12:15:18.336" v="936" actId="20577"/>
+        <pc:chgData name="beren sarı" userId="ee17b9781157bf7b" providerId="Windows Live" clId="Web-{A123BB24-4108-EFFD-8D12-5C3EE2CA58CD}" dt="2025-03-07T12:27:23.013" v="1303" actId="20577"/>
         <pc:sldMkLst>
           <pc:docMk/>
           <pc:sldMk cId="3217141839" sldId="258"/>
@@ -190,7 +191,7 @@
           </ac:spMkLst>
         </pc:spChg>
         <pc:spChg chg="mod">
-          <ac:chgData name="beren sarı" userId="ee17b9781157bf7b" providerId="Windows Live" clId="Web-{A123BB24-4108-EFFD-8D12-5C3EE2CA58CD}" dt="2025-03-07T11:52:40.283" v="927" actId="20577"/>
+          <ac:chgData name="beren sarı" userId="ee17b9781157bf7b" providerId="Windows Live" clId="Web-{A123BB24-4108-EFFD-8D12-5C3EE2CA58CD}" dt="2025-03-07T12:27:23.013" v="1303" actId="20577"/>
           <ac:spMkLst>
             <pc:docMk/>
             <pc:sldMk cId="3217141839" sldId="258"/>
@@ -199,7 +200,7 @@
         </pc:spChg>
       </pc:sldChg>
       <pc:sldChg chg="addSp delSp modSp new mod setBg">
-        <pc:chgData name="beren sarı" userId="ee17b9781157bf7b" providerId="Windows Live" clId="Web-{A123BB24-4108-EFFD-8D12-5C3EE2CA58CD}" dt="2025-03-07T11:26:36.636" v="926" actId="20577"/>
+        <pc:chgData name="beren sarı" userId="ee17b9781157bf7b" providerId="Windows Live" clId="Web-{A123BB24-4108-EFFD-8D12-5C3EE2CA58CD}" dt="2025-03-07T12:27:39.795" v="1308" actId="1076"/>
         <pc:sldMkLst>
           <pc:docMk/>
           <pc:sldMk cId="3785688334" sldId="259"/>
@@ -229,7 +230,7 @@
           </ac:spMkLst>
         </pc:spChg>
         <pc:spChg chg="add mod">
-          <ac:chgData name="beren sarı" userId="ee17b9781157bf7b" providerId="Windows Live" clId="Web-{A123BB24-4108-EFFD-8D12-5C3EE2CA58CD}" dt="2025-03-07T11:26:36.636" v="926" actId="20577"/>
+          <ac:chgData name="beren sarı" userId="ee17b9781157bf7b" providerId="Windows Live" clId="Web-{A123BB24-4108-EFFD-8D12-5C3EE2CA58CD}" dt="2025-03-07T12:27:39.795" v="1308" actId="1076"/>
           <ac:spMkLst>
             <pc:docMk/>
             <pc:sldMk cId="3785688334" sldId="259"/>
@@ -262,7 +263,7 @@
         </pc:picChg>
       </pc:sldChg>
       <pc:sldChg chg="addSp modSp new">
-        <pc:chgData name="beren sarı" userId="ee17b9781157bf7b" providerId="Windows Live" clId="Web-{A123BB24-4108-EFFD-8D12-5C3EE2CA58CD}" dt="2025-03-07T12:19:37.859" v="1042" actId="1076"/>
+        <pc:chgData name="beren sarı" userId="ee17b9781157bf7b" providerId="Windows Live" clId="Web-{A123BB24-4108-EFFD-8D12-5C3EE2CA58CD}" dt="2025-03-07T12:27:08.685" v="1301" actId="20577"/>
         <pc:sldMkLst>
           <pc:docMk/>
           <pc:sldMk cId="2231968515" sldId="260"/>
@@ -276,7 +277,7 @@
           </ac:spMkLst>
         </pc:spChg>
         <pc:spChg chg="mod">
-          <ac:chgData name="beren sarı" userId="ee17b9781157bf7b" providerId="Windows Live" clId="Web-{A123BB24-4108-EFFD-8D12-5C3EE2CA58CD}" dt="2025-03-07T12:16:33.494" v="956" actId="20577"/>
+          <ac:chgData name="beren sarı" userId="ee17b9781157bf7b" providerId="Windows Live" clId="Web-{A123BB24-4108-EFFD-8D12-5C3EE2CA58CD}" dt="2025-03-07T12:27:08.685" v="1301" actId="20577"/>
           <ac:spMkLst>
             <pc:docMk/>
             <pc:sldMk cId="2231968515" sldId="260"/>
@@ -292,11 +293,34 @@
           </ac:spMkLst>
         </pc:spChg>
         <pc:spChg chg="add mod">
-          <ac:chgData name="beren sarı" userId="ee17b9781157bf7b" providerId="Windows Live" clId="Web-{A123BB24-4108-EFFD-8D12-5C3EE2CA58CD}" dt="2025-03-07T12:19:37.859" v="1042" actId="1076"/>
+          <ac:chgData name="beren sarı" userId="ee17b9781157bf7b" providerId="Windows Live" clId="Web-{A123BB24-4108-EFFD-8D12-5C3EE2CA58CD}" dt="2025-03-07T12:26:51.981" v="1299" actId="1076"/>
           <ac:spMkLst>
             <pc:docMk/>
             <pc:sldMk cId="2231968515" sldId="260"/>
             <ac:spMk id="5" creationId="{78DD4D83-D3C8-3B6C-0EA9-0EBA1A7CE086}"/>
+          </ac:spMkLst>
+        </pc:spChg>
+      </pc:sldChg>
+      <pc:sldChg chg="modSp new">
+        <pc:chgData name="beren sarı" userId="ee17b9781157bf7b" providerId="Windows Live" clId="Web-{A123BB24-4108-EFFD-8D12-5C3EE2CA58CD}" dt="2025-03-07T12:26:24.809" v="1293" actId="20577"/>
+        <pc:sldMkLst>
+          <pc:docMk/>
+          <pc:sldMk cId="2213680454" sldId="261"/>
+        </pc:sldMkLst>
+        <pc:spChg chg="mod">
+          <ac:chgData name="beren sarı" userId="ee17b9781157bf7b" providerId="Windows Live" clId="Web-{A123BB24-4108-EFFD-8D12-5C3EE2CA58CD}" dt="2025-03-07T12:23:49.366" v="1211" actId="20577"/>
+          <ac:spMkLst>
+            <pc:docMk/>
+            <pc:sldMk cId="2213680454" sldId="261"/>
+            <ac:spMk id="2" creationId="{DAF0A046-452F-381D-F7A9-3661D05BC8C4}"/>
+          </ac:spMkLst>
+        </pc:spChg>
+        <pc:spChg chg="mod">
+          <ac:chgData name="beren sarı" userId="ee17b9781157bf7b" providerId="Windows Live" clId="Web-{A123BB24-4108-EFFD-8D12-5C3EE2CA58CD}" dt="2025-03-07T12:26:24.809" v="1293" actId="20577"/>
+          <ac:spMkLst>
+            <pc:docMk/>
+            <pc:sldMk cId="2213680454" sldId="261"/>
+            <ac:spMk id="3" creationId="{431F6C54-EFD3-1480-47E7-6C51E2656C84}"/>
           </ac:spMkLst>
         </pc:spChg>
       </pc:sldChg>
@@ -4511,8 +4535,9 @@
             </a:r>
           </a:p>
           <a:p>
-            <a:pPr marL="0" indent="0">
-              <a:buNone/>
+            <a:pPr marL="383540" indent="-383540">
+              <a:buFont typeface="Arial" panose="020B0503020102020204" pitchFamily="34" charset="0"/>
+              <a:buChar char="•"/>
             </a:pPr>
             <a:r>
               <a:rPr lang="tr-TR" dirty="0"/>
@@ -4536,8 +4561,9 @@
             </a:r>
           </a:p>
           <a:p>
-            <a:pPr marL="0" indent="0">
-              <a:buNone/>
+            <a:pPr marL="383540" indent="-383540">
+              <a:buFont typeface="Arial" panose="020B0503020102020204" pitchFamily="34" charset="0"/>
+              <a:buChar char="•"/>
             </a:pPr>
             <a:r>
               <a:rPr lang="tr-TR" dirty="0"/>
@@ -4577,15 +4603,16 @@
             </a:r>
           </a:p>
           <a:p>
-            <a:pPr marL="0" indent="0">
-              <a:buNone/>
+            <a:pPr marL="383540" indent="-383540">
+              <a:buFont typeface="Arial" panose="020B0503020102020204" pitchFamily="34" charset="0"/>
+              <a:buChar char="•"/>
             </a:pPr>
             <a:r>
               <a:rPr lang="tr-TR" dirty="0"/>
               <a:t>Git log = </a:t>
             </a:r>
             <a:r>
-              <a:rPr lang="tr-TR" dirty="0" err="1"/>
+              <a:rPr lang="tr-TR" err="1"/>
               <a:t>Commitleri</a:t>
             </a:r>
             <a:r>
@@ -5510,8 +5537,8 @@
         </p:nvSpPr>
         <p:spPr>
           <a:xfrm>
-            <a:off x="631031" y="4964906"/>
-            <a:ext cx="10894217" cy="1785104"/>
+            <a:off x="631031" y="4792378"/>
+            <a:ext cx="10894217" cy="2062103"/>
           </a:xfrm>
           <a:prstGeom prst="rect">
             <a:avLst/>
@@ -5527,6 +5554,10 @@
           </a:bodyPr>
           <a:lstStyle/>
           <a:p>
+            <a:pPr marL="342900" indent="-342900">
+              <a:buFont typeface="Wingdings"/>
+              <a:buChar char="§"/>
+            </a:pPr>
             <a:r>
               <a:rPr lang="tr-TR" sz="2000" b="1" dirty="0"/>
               <a:t>Bazı Örnek </a:t>
@@ -5539,14 +5570,19 @@
               <a:rPr lang="tr-TR" sz="2000" b="1" dirty="0"/>
               <a:t> Komutları:</a:t>
             </a:r>
-          </a:p>
-          <a:p>
+            <a:endParaRPr lang="tr-TR"/>
+          </a:p>
+          <a:p>
+            <a:pPr marL="285750" indent="-285750">
+              <a:buFont typeface="Wingdings"/>
+              <a:buChar char="§"/>
+            </a:pPr>
             <a:r>
               <a:rPr lang="tr-TR" dirty="0"/>
               <a:t>Git </a:t>
             </a:r>
             <a:r>
-              <a:rPr lang="tr-TR" dirty="0" err="1"/>
+              <a:rPr lang="tr-TR" err="1"/>
               <a:t>branch</a:t>
             </a:r>
             <a:r>
@@ -5554,7 +5590,7 @@
               <a:t> = Güncel </a:t>
             </a:r>
             <a:r>
-              <a:rPr lang="tr-TR" dirty="0" err="1"/>
+              <a:rPr lang="tr-TR" err="1"/>
               <a:t>branchleri</a:t>
             </a:r>
             <a:r>
@@ -5564,6 +5600,10 @@
             <a:endParaRPr lang="tr-TR"/>
           </a:p>
           <a:p>
+            <a:pPr marL="285750" indent="-285750">
+              <a:buFont typeface="Wingdings"/>
+              <a:buChar char="§"/>
+            </a:pPr>
             <a:r>
               <a:rPr lang="tr-TR" dirty="0"/>
               <a:t>Git </a:t>
@@ -5594,12 +5634,16 @@
             </a:r>
           </a:p>
           <a:p>
+            <a:pPr marL="285750" indent="-285750">
+              <a:buFont typeface="Wingdings"/>
+              <a:buChar char="§"/>
+            </a:pPr>
             <a:r>
               <a:rPr lang="tr-TR" dirty="0"/>
               <a:t>Git </a:t>
             </a:r>
             <a:r>
-              <a:rPr lang="tr-TR" dirty="0" err="1"/>
+              <a:rPr lang="tr-TR" err="1"/>
               <a:t>switch</a:t>
             </a:r>
             <a:r>
@@ -5607,7 +5651,7 @@
               <a:t> = Farklı bir </a:t>
             </a:r>
             <a:r>
-              <a:rPr lang="tr-TR" dirty="0" err="1"/>
+              <a:rPr lang="tr-TR" err="1"/>
               <a:t>branche</a:t>
             </a:r>
             <a:r>
@@ -5616,6 +5660,10 @@
             </a:r>
           </a:p>
           <a:p>
+            <a:pPr marL="285750" indent="-285750">
+              <a:buFont typeface="Wingdings"/>
+              <a:buChar char="§"/>
+            </a:pPr>
             <a:r>
               <a:rPr lang="tr-TR" dirty="0"/>
               <a:t>Git </a:t>
@@ -5638,6 +5686,10 @@
             </a:r>
           </a:p>
           <a:p>
+            <a:pPr marL="285750" indent="-285750">
+              <a:buFont typeface="Wingdings"/>
+              <a:buChar char="§"/>
+            </a:pPr>
             <a:r>
               <a:rPr lang="tr-TR" dirty="0">
                 <a:ea typeface="+mn-lt"/>
@@ -5646,7 +5698,7 @@
               <a:t>Git </a:t>
             </a:r>
             <a:r>
-              <a:rPr lang="tr-TR" dirty="0" err="1">
+              <a:rPr lang="tr-TR" err="1">
                 <a:ea typeface="+mn-lt"/>
                 <a:cs typeface="+mn-lt"/>
               </a:rPr>
@@ -5660,7 +5712,7 @@
               <a:t> = Git </a:t>
             </a:r>
             <a:r>
-              <a:rPr lang="tr-TR" dirty="0" err="1">
+              <a:rPr lang="tr-TR" err="1">
                 <a:ea typeface="+mn-lt"/>
                 <a:cs typeface="+mn-lt"/>
               </a:rPr>
@@ -5674,7 +5726,7 @@
               <a:t> işlevlerini yapar ama bunun yeni bir </a:t>
             </a:r>
             <a:r>
-              <a:rPr lang="tr-TR" dirty="0" err="1">
+              <a:rPr lang="tr-TR" err="1">
                 <a:ea typeface="+mn-lt"/>
                 <a:cs typeface="+mn-lt"/>
               </a:rPr>
@@ -5791,7 +5843,10 @@
           </a:bodyPr>
           <a:lstStyle/>
           <a:p>
-            <a:pPr marL="383540" indent="-383540"/>
+            <a:pPr marL="383540" indent="-383540">
+              <a:buFont typeface="Wingdings" panose="020B0503020102020204" pitchFamily="34" charset="0"/>
+              <a:buChar char="§"/>
+            </a:pPr>
             <a:r>
               <a:rPr lang="tr-TR" sz="2400" dirty="0">
                 <a:ea typeface="+mn-lt"/>
@@ -5800,7 +5855,7 @@
               <a:t>İki farklı </a:t>
             </a:r>
             <a:r>
-              <a:rPr lang="tr-TR" sz="2400" dirty="0" err="1">
+              <a:rPr lang="tr-TR" sz="2400" err="1">
                 <a:ea typeface="+mn-lt"/>
                 <a:cs typeface="+mn-lt"/>
               </a:rPr>
@@ -5814,7 +5869,7 @@
               <a:t> ayrıldıktan sonra ana daldan ayrılan </a:t>
             </a:r>
             <a:r>
-              <a:rPr lang="tr-TR" sz="2400" dirty="0" err="1">
+              <a:rPr lang="tr-TR" sz="2400" err="1">
                 <a:ea typeface="+mn-lt"/>
                 <a:cs typeface="+mn-lt"/>
               </a:rPr>
@@ -5828,7 +5883,7 @@
               <a:t> işlem yapmaya devam edip ana </a:t>
             </a:r>
             <a:r>
-              <a:rPr lang="tr-TR" sz="2400" dirty="0" err="1">
+              <a:rPr lang="tr-TR" sz="2400" err="1">
                 <a:ea typeface="+mn-lt"/>
                 <a:cs typeface="+mn-lt"/>
               </a:rPr>
@@ -5842,7 +5897,7 @@
               <a:t> üzerinde işlem yapılmamasından sonra ayrılan </a:t>
             </a:r>
             <a:r>
-              <a:rPr lang="tr-TR" sz="2400" dirty="0" err="1">
+              <a:rPr lang="tr-TR" sz="2400" err="1">
                 <a:ea typeface="+mn-lt"/>
                 <a:cs typeface="+mn-lt"/>
               </a:rPr>
@@ -5856,7 +5911,7 @@
               <a:t> </a:t>
             </a:r>
             <a:r>
-              <a:rPr lang="tr-TR" sz="2400" dirty="0" err="1">
+              <a:rPr lang="tr-TR" sz="2400" err="1">
                 <a:ea typeface="+mn-lt"/>
                 <a:cs typeface="+mn-lt"/>
               </a:rPr>
@@ -5870,7 +5925,7 @@
               <a:t> ilk </a:t>
             </a:r>
             <a:r>
-              <a:rPr lang="tr-TR" sz="2400" dirty="0" err="1">
+              <a:rPr lang="tr-TR" sz="2400" err="1">
                 <a:ea typeface="+mn-lt"/>
                 <a:cs typeface="+mn-lt"/>
               </a:rPr>
@@ -5948,8 +6003,8 @@
         </p:nvSpPr>
         <p:spPr>
           <a:xfrm>
-            <a:off x="1369109" y="4433649"/>
-            <a:ext cx="9594272" cy="830997"/>
+            <a:off x="1369109" y="4419271"/>
+            <a:ext cx="10011215" cy="1200329"/>
           </a:xfrm>
           <a:prstGeom prst="rect">
             <a:avLst/>
@@ -5965,18 +6020,31 @@
           </a:bodyPr>
           <a:lstStyle/>
           <a:p>
+            <a:pPr marL="342900" indent="-342900">
+              <a:buFont typeface="Wingdings"/>
+              <a:buChar char="§"/>
+            </a:pPr>
             <a:r>
               <a:rPr lang="tr-TR" sz="2400" dirty="0"/>
               <a:t>Bir projede çalışan iki kişinin aynı kısımda değişiklik yapması sonucu projeyi </a:t>
             </a:r>
             <a:r>
-              <a:rPr lang="tr-TR" sz="2400" dirty="0" err="1"/>
+              <a:rPr lang="tr-TR" sz="2400" err="1"/>
               <a:t>merge</a:t>
             </a:r>
             <a:r>
               <a:rPr lang="tr-TR" sz="2400" dirty="0"/>
-              <a:t> ederken oluşan sorun.</a:t>
-            </a:r>
+              <a:t> ederken oluşan </a:t>
+            </a:r>
+            <a:r>
+              <a:rPr lang="tr-TR" sz="2400" err="1"/>
+              <a:t>sorun.Çakışma</a:t>
+            </a:r>
+            <a:r>
+              <a:rPr lang="tr-TR" sz="2400" dirty="0"/>
+              <a:t> gerçekleştikten sonra "git reset" gibi komutlarla durum geri alınabilir.</a:t>
+            </a:r>
+            <a:endParaRPr lang="tr-TR"/>
           </a:p>
         </p:txBody>
       </p:sp>
@@ -5984,6 +6052,103 @@
     <p:extLst>
       <p:ext uri="{BB962C8B-B14F-4D97-AF65-F5344CB8AC3E}">
         <p14:creationId xmlns:p14="http://schemas.microsoft.com/office/powerpoint/2010/main" val="2231968515"/>
+      </p:ext>
+    </p:extLst>
+  </p:cSld>
+  <p:clrMapOvr>
+    <a:masterClrMapping/>
+  </p:clrMapOvr>
+</p:sld>
+</file>
+
+<file path=ppt/slides/slide6.xml><?xml version="1.0" encoding="utf-8"?>
+<p:sld xmlns:a="http://schemas.openxmlformats.org/drawingml/2006/main" xmlns:r="http://schemas.openxmlformats.org/officeDocument/2006/relationships" xmlns:p="http://schemas.openxmlformats.org/presentationml/2006/main">
+  <p:cSld>
+    <p:spTree>
+      <p:nvGrpSpPr>
+        <p:cNvPr id="1" name=""/>
+        <p:cNvGrpSpPr/>
+        <p:nvPr/>
+      </p:nvGrpSpPr>
+      <p:grpSpPr>
+        <a:xfrm>
+          <a:off x="0" y="0"/>
+          <a:ext cx="0" cy="0"/>
+          <a:chOff x="0" y="0"/>
+          <a:chExt cx="0" cy="0"/>
+        </a:xfrm>
+      </p:grpSpPr>
+      <p:sp>
+        <p:nvSpPr>
+          <p:cNvPr id="2" name="Başlık 1">
+            <a:extLst>
+              <a:ext uri="{FF2B5EF4-FFF2-40B4-BE49-F238E27FC236}">
+                <a16:creationId xmlns:a16="http://schemas.microsoft.com/office/drawing/2014/main" id="{DAF0A046-452F-381D-F7A9-3661D05BC8C4}"/>
+              </a:ext>
+            </a:extLst>
+          </p:cNvPr>
+          <p:cNvSpPr>
+            <a:spLocks noGrp="1"/>
+          </p:cNvSpPr>
+          <p:nvPr>
+            <p:ph type="title"/>
+          </p:nvPr>
+        </p:nvSpPr>
+        <p:spPr/>
+        <p:txBody>
+          <a:bodyPr/>
+          <a:lstStyle/>
+          <a:p>
+            <a:r>
+              <a:rPr lang="tr-TR" b="1" dirty="0"/>
+              <a:t>GİTHUB</a:t>
+            </a:r>
+          </a:p>
+        </p:txBody>
+      </p:sp>
+      <p:sp>
+        <p:nvSpPr>
+          <p:cNvPr id="3" name="İçerik Yer Tutucusu 2">
+            <a:extLst>
+              <a:ext uri="{FF2B5EF4-FFF2-40B4-BE49-F238E27FC236}">
+                <a16:creationId xmlns:a16="http://schemas.microsoft.com/office/drawing/2014/main" id="{431F6C54-EFD3-1480-47E7-6C51E2656C84}"/>
+              </a:ext>
+            </a:extLst>
+          </p:cNvPr>
+          <p:cNvSpPr>
+            <a:spLocks noGrp="1"/>
+          </p:cNvSpPr>
+          <p:nvPr>
+            <p:ph idx="1"/>
+          </p:nvPr>
+        </p:nvSpPr>
+        <p:spPr/>
+        <p:txBody>
+          <a:bodyPr vert="horz" lIns="91440" tIns="45720" rIns="91440" bIns="45720" rtlCol="0" anchor="t">
+            <a:normAutofit/>
+          </a:bodyPr>
+          <a:lstStyle/>
+          <a:p>
+            <a:pPr marL="383540" indent="-383540"/>
+            <a:r>
+              <a:rPr lang="tr-TR" sz="2400" dirty="0"/>
+              <a:t>Git versiyon kontrol sistemi üzerinde çalıştığımız projeleri yükleyebileceğimiz herkesle paylaşabileceğimiz bir sistem olarak </a:t>
+            </a:r>
+            <a:r>
+              <a:rPr lang="tr-TR" sz="2400" dirty="0" err="1"/>
+              <a:t>adlandırabiliriz.Gerek</a:t>
+            </a:r>
+            <a:r>
+              <a:rPr lang="tr-TR" sz="2400" dirty="0"/>
+              <a:t> büyük depolama alanıyla gerek grup olarak çalışılmasının sağlanmasında rol oynar.</a:t>
+            </a:r>
+          </a:p>
+        </p:txBody>
+      </p:sp>
+    </p:spTree>
+    <p:extLst>
+      <p:ext uri="{BB962C8B-B14F-4D97-AF65-F5344CB8AC3E}">
+        <p14:creationId xmlns:p14="http://schemas.microsoft.com/office/powerpoint/2010/main" val="2213680454"/>
       </p:ext>
     </p:extLst>
   </p:cSld>

</xml_diff>

<commit_message>
Fork ve Pull R düzeltildi
</commit_message>
<xml_diff>
--- a/Gitsunum.pptx
+++ b/Gitsunum.pptx
@@ -11,6 +11,7 @@
     <p:sldId id="259" r:id="rId5"/>
     <p:sldId id="260" r:id="rId6"/>
     <p:sldId id="261" r:id="rId7"/>
+    <p:sldId id="262" r:id="rId8"/>
   </p:sldIdLst>
   <p:sldSz cx="12192000" cy="6858000"/>
   <p:notesSz cx="6858000" cy="9144000"/>
@@ -120,16 +121,45 @@
 <file path=ppt/revisionInfo.xml><?xml version="1.0" encoding="utf-8"?>
 <p1510:revInfo xmlns:a="http://schemas.openxmlformats.org/drawingml/2006/main" xmlns:r="http://schemas.openxmlformats.org/officeDocument/2006/relationships" xmlns:p1510="http://schemas.microsoft.com/office/powerpoint/2015/10/main">
   <p1510:revLst>
-    <p1510:client id="{08D64386-19A3-6B06-AD19-AA732D24D73D}" v="11" dt="2025-03-07T10:18:55.338"/>
-    <p1510:client id="{220426D4-292A-19F7-1104-2898146CA523}" v="1" dt="2025-03-07T09:52:54.804"/>
-    <p1510:client id="{A123BB24-4108-EFFD-8D12-5C3EE2CA58CD}" v="1965" dt="2025-03-07T12:27:39.795"/>
-    <p1510:client id="{CEF14E3E-4315-2E37-2315-E7B5AC358147}" v="125" dt="2025-03-07T10:30:54.841"/>
+    <p1510:client id="{7FEB1BE5-1E02-0BC5-3587-561BE8312F4A}" v="23" dt="2025-03-09T20:14:10.008"/>
   </p1510:revLst>
 </p1510:revInfo>
 </file>
 
 <file path=ppt/changesInfos/changesInfo1.xml><?xml version="1.0" encoding="utf-8"?>
 <pc:chgInfo xmlns:a="http://schemas.openxmlformats.org/drawingml/2006/main" xmlns:r="http://schemas.openxmlformats.org/officeDocument/2006/relationships" xmlns:ac="http://schemas.microsoft.com/office/drawing/2013/main/command" xmlns:pc="http://schemas.microsoft.com/office/powerpoint/2013/main/command">
+  <pc:docChgLst>
+    <pc:chgData name="beren sarı" userId="ee17b9781157bf7b" providerId="Windows Live" clId="Web-{7FEB1BE5-1E02-0BC5-3587-561BE8312F4A}"/>
+    <pc:docChg chg="addSld modSld">
+      <pc:chgData name="beren sarı" userId="ee17b9781157bf7b" providerId="Windows Live" clId="Web-{7FEB1BE5-1E02-0BC5-3587-561BE8312F4A}" dt="2025-03-09T20:14:10.008" v="24" actId="20577"/>
+      <pc:docMkLst>
+        <pc:docMk/>
+      </pc:docMkLst>
+      <pc:sldChg chg="modSp new">
+        <pc:chgData name="beren sarı" userId="ee17b9781157bf7b" providerId="Windows Live" clId="Web-{7FEB1BE5-1E02-0BC5-3587-561BE8312F4A}" dt="2025-03-09T20:14:10.008" v="24" actId="20577"/>
+        <pc:sldMkLst>
+          <pc:docMk/>
+          <pc:sldMk cId="3036328080" sldId="262"/>
+        </pc:sldMkLst>
+        <pc:spChg chg="mod">
+          <ac:chgData name="beren sarı" userId="ee17b9781157bf7b" providerId="Windows Live" clId="Web-{7FEB1BE5-1E02-0BC5-3587-561BE8312F4A}" dt="2025-03-09T20:13:57.320" v="23" actId="14100"/>
+          <ac:spMkLst>
+            <pc:docMk/>
+            <pc:sldMk cId="3036328080" sldId="262"/>
+            <ac:spMk id="2" creationId="{6F6F7C10-A6B2-758B-8996-BE19DD21D975}"/>
+          </ac:spMkLst>
+        </pc:spChg>
+        <pc:spChg chg="mod">
+          <ac:chgData name="beren sarı" userId="ee17b9781157bf7b" providerId="Windows Live" clId="Web-{7FEB1BE5-1E02-0BC5-3587-561BE8312F4A}" dt="2025-03-09T20:14:10.008" v="24" actId="20577"/>
+          <ac:spMkLst>
+            <pc:docMk/>
+            <pc:sldMk cId="3036328080" sldId="262"/>
+            <ac:spMk id="3" creationId="{A5FB92C0-84E9-5FAF-1F37-FCAB3015FFEB}"/>
+          </ac:spMkLst>
+        </pc:spChg>
+      </pc:sldChg>
+    </pc:docChg>
+  </pc:docChgLst>
   <pc:docChgLst>
     <pc:chgData name="beren sarı" userId="ee17b9781157bf7b" providerId="Windows Live" clId="Web-{220426D4-292A-19F7-1104-2898146CA523}"/>
     <pc:docChg chg="addSld">
@@ -566,7 +596,7 @@
             <a:fld id="{87DE6118-2437-4B30-8E3C-4D2BE6020583}" type="datetimeFigureOut">
               <a:rPr lang="en-US" dirty="0"/>
               <a:pPr rtl="0"/>
-              <a:t>3/7/2025</a:t>
+              <a:t>3/9/2025</a:t>
             </a:fld>
             <a:endParaRPr lang="en-US"/>
           </a:p>
@@ -896,7 +926,7 @@
             <a:pPr rtl="0"/>
             <a:fld id="{87DE6118-2437-4B30-8E3C-4D2BE6020583}" type="datetimeFigureOut">
               <a:rPr lang="en-US" dirty="0"/>
-              <a:t>3/7/2025</a:t>
+              <a:t>3/9/2025</a:t>
             </a:fld>
             <a:endParaRPr lang="en-US"/>
           </a:p>
@@ -1075,7 +1105,7 @@
             <a:pPr rtl="0"/>
             <a:fld id="{87DE6118-2437-4B30-8E3C-4D2BE6020583}" type="datetimeFigureOut">
               <a:rPr lang="en-US" dirty="0"/>
-              <a:t>3/7/2025</a:t>
+              <a:t>3/9/2025</a:t>
             </a:fld>
             <a:endParaRPr lang="en-US"/>
           </a:p>
@@ -1244,7 +1274,7 @@
             <a:pPr rtl="0"/>
             <a:fld id="{87DE6118-2437-4B30-8E3C-4D2BE6020583}" type="datetimeFigureOut">
               <a:rPr lang="en-US" dirty="0"/>
-              <a:t>3/7/2025</a:t>
+              <a:t>3/9/2025</a:t>
             </a:fld>
             <a:endParaRPr lang="en-US"/>
           </a:p>
@@ -1521,7 +1551,7 @@
             <a:fld id="{87DE6118-2437-4B30-8E3C-4D2BE6020583}" type="datetimeFigureOut">
               <a:rPr lang="en-US" dirty="0"/>
               <a:pPr rtl="0"/>
-              <a:t>3/7/2025</a:t>
+              <a:t>3/9/2025</a:t>
             </a:fld>
             <a:endParaRPr lang="en-US"/>
           </a:p>
@@ -1915,7 +1945,7 @@
             <a:pPr rtl="0"/>
             <a:fld id="{87DE6118-2437-4B30-8E3C-4D2BE6020583}" type="datetimeFigureOut">
               <a:rPr lang="en-US" dirty="0"/>
-              <a:t>3/7/2025</a:t>
+              <a:t>3/9/2025</a:t>
             </a:fld>
             <a:endParaRPr lang="en-US"/>
           </a:p>
@@ -2391,7 +2421,7 @@
             <a:pPr rtl="0"/>
             <a:fld id="{87DE6118-2437-4B30-8E3C-4D2BE6020583}" type="datetimeFigureOut">
               <a:rPr lang="en-US" dirty="0"/>
-              <a:t>3/7/2025</a:t>
+              <a:t>3/9/2025</a:t>
             </a:fld>
             <a:endParaRPr lang="en-US"/>
           </a:p>
@@ -2508,7 +2538,7 @@
             <a:pPr rtl="0"/>
             <a:fld id="{87DE6118-2437-4B30-8E3C-4D2BE6020583}" type="datetimeFigureOut">
               <a:rPr lang="en-US" dirty="0"/>
-              <a:t>3/7/2025</a:t>
+              <a:t>3/9/2025</a:t>
             </a:fld>
             <a:endParaRPr lang="en-US"/>
           </a:p>
@@ -2601,7 +2631,7 @@
             <a:pPr rtl="0"/>
             <a:fld id="{87DE6118-2437-4B30-8E3C-4D2BE6020583}" type="datetimeFigureOut">
               <a:rPr lang="en-US" dirty="0"/>
-              <a:t>3/7/2025</a:t>
+              <a:t>3/9/2025</a:t>
             </a:fld>
             <a:endParaRPr lang="en-US"/>
           </a:p>
@@ -2947,7 +2977,7 @@
             <a:fld id="{87DE6118-2437-4B30-8E3C-4D2BE6020583}" type="datetimeFigureOut">
               <a:rPr lang="en-US" dirty="0"/>
               <a:pPr rtl="0"/>
-              <a:t>3/7/2025</a:t>
+              <a:t>3/9/2025</a:t>
             </a:fld>
             <a:endParaRPr lang="en-US"/>
           </a:p>
@@ -3337,7 +3367,7 @@
             <a:fld id="{87DE6118-2437-4B30-8E3C-4D2BE6020583}" type="datetimeFigureOut">
               <a:rPr lang="en-US" dirty="0"/>
               <a:pPr rtl="0"/>
-              <a:t>3/7/2025</a:t>
+              <a:t>3/9/2025</a:t>
             </a:fld>
             <a:endParaRPr lang="en-US"/>
           </a:p>
@@ -3616,7 +3646,7 @@
             <a:fld id="{87DE6118-2437-4B30-8E3C-4D2BE6020583}" type="datetimeFigureOut">
               <a:rPr lang="en-US" dirty="0"/>
               <a:pPr rtl="0"/>
-              <a:t>3/7/2025</a:t>
+              <a:t>3/9/2025</a:t>
             </a:fld>
             <a:endParaRPr lang="en-US"/>
           </a:p>
@@ -6158,6 +6188,282 @@
 </p:sld>
 </file>
 
+<file path=ppt/slides/slide7.xml><?xml version="1.0" encoding="utf-8"?>
+<p:sld xmlns:a="http://schemas.openxmlformats.org/drawingml/2006/main" xmlns:r="http://schemas.openxmlformats.org/officeDocument/2006/relationships" xmlns:p="http://schemas.openxmlformats.org/presentationml/2006/main">
+  <p:cSld>
+    <p:spTree>
+      <p:nvGrpSpPr>
+        <p:cNvPr id="1" name=""/>
+        <p:cNvGrpSpPr/>
+        <p:nvPr/>
+      </p:nvGrpSpPr>
+      <p:grpSpPr>
+        <a:xfrm>
+          <a:off x="0" y="0"/>
+          <a:ext cx="0" cy="0"/>
+          <a:chOff x="0" y="0"/>
+          <a:chExt cx="0" cy="0"/>
+        </a:xfrm>
+      </p:grpSpPr>
+      <p:sp>
+        <p:nvSpPr>
+          <p:cNvPr id="2" name="Başlık 1">
+            <a:extLst>
+              <a:ext uri="{FF2B5EF4-FFF2-40B4-BE49-F238E27FC236}">
+                <a16:creationId xmlns:a16="http://schemas.microsoft.com/office/drawing/2014/main" id="{6F6F7C10-A6B2-758B-8996-BE19DD21D975}"/>
+              </a:ext>
+            </a:extLst>
+          </p:cNvPr>
+          <p:cNvSpPr>
+            <a:spLocks noGrp="1"/>
+          </p:cNvSpPr>
+          <p:nvPr>
+            <p:ph type="title"/>
+          </p:nvPr>
+        </p:nvSpPr>
+        <p:spPr>
+          <a:xfrm>
+            <a:off x="1371600" y="685800"/>
+            <a:ext cx="9601200" cy="1890712"/>
+          </a:xfrm>
+        </p:spPr>
+        <p:txBody>
+          <a:bodyPr>
+            <a:normAutofit fontScale="90000"/>
+          </a:bodyPr>
+          <a:lstStyle/>
+          <a:p>
+            <a:pPr marL="571500" indent="-571500">
+              <a:buFont typeface="Arial"/>
+              <a:buChar char="•"/>
+            </a:pPr>
+            <a:r>
+              <a:rPr lang="tr-TR" b="1" err="1"/>
+              <a:t>Fork</a:t>
+            </a:r>
+            <a:br>
+              <a:rPr lang="tr-TR" b="1" dirty="0"/>
+            </a:br>
+            <a:r>
+              <a:rPr lang="tr-TR" sz="2400" err="1">
+                <a:solidFill>
+                  <a:srgbClr val="242424"/>
+                </a:solidFill>
+                <a:ea typeface="+mj-lt"/>
+                <a:cs typeface="+mj-lt"/>
+              </a:rPr>
+              <a:t>Repository’nin</a:t>
+            </a:r>
+            <a:r>
+              <a:rPr lang="tr-TR" sz="2400" dirty="0">
+                <a:solidFill>
+                  <a:srgbClr val="242424"/>
+                </a:solidFill>
+                <a:ea typeface="+mj-lt"/>
+                <a:cs typeface="+mj-lt"/>
+              </a:rPr>
+              <a:t> bir kopyasının alınmasıdır. Temel anlamda </a:t>
+            </a:r>
+            <a:r>
+              <a:rPr lang="tr-TR" sz="2400" err="1">
+                <a:solidFill>
+                  <a:srgbClr val="242424"/>
+                </a:solidFill>
+                <a:ea typeface="+mj-lt"/>
+                <a:cs typeface="+mj-lt"/>
+              </a:rPr>
+              <a:t>forkun</a:t>
+            </a:r>
+            <a:r>
+              <a:rPr lang="tr-TR" sz="2400" dirty="0">
+                <a:solidFill>
+                  <a:srgbClr val="242424"/>
+                </a:solidFill>
+                <a:ea typeface="+mj-lt"/>
+                <a:cs typeface="+mj-lt"/>
+              </a:rPr>
+              <a:t> kullanım amacı alınan bu kopya üzerinde değişiklikler yaptıktan sonra projenin ana reposuna gönderilerek projenin gelişmesine katkı sağlamaktır.</a:t>
+            </a:r>
+            <a:endParaRPr lang="tr-TR" sz="2400" dirty="0"/>
+          </a:p>
+        </p:txBody>
+      </p:sp>
+      <p:sp>
+        <p:nvSpPr>
+          <p:cNvPr id="3" name="İçerik Yer Tutucusu 2">
+            <a:extLst>
+              <a:ext uri="{FF2B5EF4-FFF2-40B4-BE49-F238E27FC236}">
+                <a16:creationId xmlns:a16="http://schemas.microsoft.com/office/drawing/2014/main" id="{A5FB92C0-84E9-5FAF-1F37-FCAB3015FFEB}"/>
+              </a:ext>
+            </a:extLst>
+          </p:cNvPr>
+          <p:cNvSpPr>
+            <a:spLocks noGrp="1"/>
+          </p:cNvSpPr>
+          <p:nvPr>
+            <p:ph idx="1"/>
+          </p:nvPr>
+        </p:nvSpPr>
+        <p:spPr>
+          <a:xfrm>
+            <a:off x="1371600" y="2845593"/>
+            <a:ext cx="9601200" cy="3021807"/>
+          </a:xfrm>
+        </p:spPr>
+        <p:txBody>
+          <a:bodyPr vert="horz" lIns="91440" tIns="45720" rIns="91440" bIns="45720" rtlCol="0" anchor="t">
+            <a:normAutofit/>
+          </a:bodyPr>
+          <a:lstStyle/>
+          <a:p>
+            <a:pPr marL="571500" indent="-571500">
+              <a:buFont typeface="Arial" panose="020B0503020102020204" pitchFamily="34" charset="0"/>
+              <a:buChar char="•"/>
+            </a:pPr>
+            <a:r>
+              <a:rPr lang="tr-TR" sz="4400" b="1" err="1">
+                <a:solidFill>
+                  <a:srgbClr val="242424"/>
+                </a:solidFill>
+                <a:ea typeface="+mn-lt"/>
+                <a:cs typeface="+mn-lt"/>
+              </a:rPr>
+              <a:t>Pull</a:t>
+            </a:r>
+            <a:r>
+              <a:rPr lang="tr-TR" sz="4400" b="1" dirty="0">
+                <a:solidFill>
+                  <a:srgbClr val="242424"/>
+                </a:solidFill>
+                <a:ea typeface="+mn-lt"/>
+                <a:cs typeface="+mn-lt"/>
+              </a:rPr>
+              <a:t> </a:t>
+            </a:r>
+            <a:r>
+              <a:rPr lang="tr-TR" sz="4400" b="1" err="1">
+                <a:solidFill>
+                  <a:srgbClr val="242424"/>
+                </a:solidFill>
+                <a:ea typeface="+mn-lt"/>
+                <a:cs typeface="+mn-lt"/>
+              </a:rPr>
+              <a:t>Request</a:t>
+            </a:r>
+            <a:endParaRPr lang="tr-TR" sz="4400" b="1">
+              <a:solidFill>
+                <a:srgbClr val="242424"/>
+              </a:solidFill>
+              <a:ea typeface="+mn-lt"/>
+              <a:cs typeface="+mn-lt"/>
+            </a:endParaRPr>
+          </a:p>
+          <a:p>
+            <a:pPr marL="571500" indent="-571500">
+              <a:buFont typeface="Arial" panose="020B0503020102020204" pitchFamily="34" charset="0"/>
+              <a:buChar char="•"/>
+            </a:pPr>
+            <a:r>
+              <a:rPr lang="tr-TR" sz="2400" err="1">
+                <a:solidFill>
+                  <a:srgbClr val="242424"/>
+                </a:solidFill>
+                <a:ea typeface="+mn-lt"/>
+                <a:cs typeface="+mn-lt"/>
+              </a:rPr>
+              <a:t>Fork</a:t>
+            </a:r>
+            <a:r>
+              <a:rPr lang="tr-TR" sz="2400" dirty="0">
+                <a:solidFill>
+                  <a:srgbClr val="242424"/>
+                </a:solidFill>
+                <a:ea typeface="+mn-lt"/>
+                <a:cs typeface="+mn-lt"/>
+              </a:rPr>
+              <a:t> edilen proje üzerinde değişiklikler yaptıktan sonra gerçek </a:t>
+            </a:r>
+            <a:r>
+              <a:rPr lang="tr-TR" sz="2400" err="1">
+                <a:solidFill>
+                  <a:srgbClr val="242424"/>
+                </a:solidFill>
+                <a:ea typeface="+mn-lt"/>
+                <a:cs typeface="+mn-lt"/>
+              </a:rPr>
+              <a:t>repository’e</a:t>
+            </a:r>
+            <a:r>
+              <a:rPr lang="tr-TR" sz="2400" dirty="0">
+                <a:solidFill>
+                  <a:srgbClr val="242424"/>
+                </a:solidFill>
+                <a:ea typeface="+mn-lt"/>
+                <a:cs typeface="+mn-lt"/>
+              </a:rPr>
+              <a:t> gönderilerek o projenin sahibi olan geliştiricinin değerlendirmesine sunmaktır. Eğer PR kabul edilirse ana </a:t>
+            </a:r>
+            <a:r>
+              <a:rPr lang="tr-TR" sz="2400" err="1">
+                <a:solidFill>
+                  <a:srgbClr val="242424"/>
+                </a:solidFill>
+                <a:ea typeface="+mn-lt"/>
+                <a:cs typeface="+mn-lt"/>
+              </a:rPr>
+              <a:t>repository</a:t>
+            </a:r>
+            <a:r>
+              <a:rPr lang="tr-TR" sz="2400" dirty="0">
+                <a:solidFill>
+                  <a:srgbClr val="242424"/>
+                </a:solidFill>
+                <a:ea typeface="+mn-lt"/>
+                <a:cs typeface="+mn-lt"/>
+              </a:rPr>
+              <a:t> üzerinde, </a:t>
+            </a:r>
+            <a:r>
+              <a:rPr lang="tr-TR" sz="2400" err="1">
+                <a:solidFill>
+                  <a:srgbClr val="242424"/>
+                </a:solidFill>
+                <a:ea typeface="+mn-lt"/>
+                <a:cs typeface="+mn-lt"/>
+              </a:rPr>
+              <a:t>fork</a:t>
+            </a:r>
+            <a:r>
+              <a:rPr lang="tr-TR" sz="2400" dirty="0">
+                <a:solidFill>
+                  <a:srgbClr val="242424"/>
+                </a:solidFill>
+                <a:ea typeface="+mn-lt"/>
+                <a:cs typeface="+mn-lt"/>
+              </a:rPr>
+              <a:t> ettiğiniz proje üzerinde değişiklikler işlenir.</a:t>
+            </a:r>
+            <a:endParaRPr lang="tr-TR" sz="2400" b="1">
+              <a:solidFill>
+                <a:srgbClr val="242424"/>
+              </a:solidFill>
+            </a:endParaRPr>
+          </a:p>
+        </p:txBody>
+      </p:sp>
+    </p:spTree>
+    <p:extLst>
+      <p:ext uri="{BB962C8B-B14F-4D97-AF65-F5344CB8AC3E}">
+        <p14:creationId xmlns:p14="http://schemas.microsoft.com/office/powerpoint/2010/main" val="3036328080"/>
+      </p:ext>
+    </p:extLst>
+  </p:cSld>
+  <p:clrMapOvr>
+    <a:masterClrMapping/>
+  </p:clrMapOvr>
+</p:sld>
+</file>
+
 <file path=ppt/theme/theme1.xml><?xml version="1.0" encoding="utf-8"?>
 <a:theme xmlns:a="http://schemas.openxmlformats.org/drawingml/2006/main" name="Ekin">
   <a:themeElements>

</xml_diff>

<commit_message>
Pull ve Fetch eklendi
</commit_message>
<xml_diff>
--- a/Gitsunum.pptx
+++ b/Gitsunum.pptx
@@ -12,6 +12,7 @@
     <p:sldId id="260" r:id="rId6"/>
     <p:sldId id="261" r:id="rId7"/>
     <p:sldId id="262" r:id="rId8"/>
+    <p:sldId id="263" r:id="rId9"/>
   </p:sldIdLst>
   <p:sldSz cx="12192000" cy="6858000"/>
   <p:notesSz cx="6858000" cy="9144000"/>
@@ -122,12 +123,45 @@
 <p1510:revInfo xmlns:a="http://schemas.openxmlformats.org/drawingml/2006/main" xmlns:r="http://schemas.openxmlformats.org/officeDocument/2006/relationships" xmlns:p1510="http://schemas.microsoft.com/office/powerpoint/2015/10/main">
   <p1510:revLst>
     <p1510:client id="{7FEB1BE5-1E02-0BC5-3587-561BE8312F4A}" v="23" dt="2025-03-09T20:14:10.008"/>
+    <p1510:client id="{A007B13A-C327-B20E-22C3-E5F201244D86}" v="150" dt="2025-03-10T05:27:00.443"/>
   </p1510:revLst>
 </p1510:revInfo>
 </file>
 
 <file path=ppt/changesInfos/changesInfo1.xml><?xml version="1.0" encoding="utf-8"?>
 <pc:chgInfo xmlns:a="http://schemas.openxmlformats.org/drawingml/2006/main" xmlns:r="http://schemas.openxmlformats.org/officeDocument/2006/relationships" xmlns:ac="http://schemas.microsoft.com/office/drawing/2013/main/command" xmlns:pc="http://schemas.microsoft.com/office/powerpoint/2013/main/command">
+  <pc:docChgLst>
+    <pc:chgData name="beren sarı" userId="ee17b9781157bf7b" providerId="Windows Live" clId="Web-{A007B13A-C327-B20E-22C3-E5F201244D86}"/>
+    <pc:docChg chg="addSld modSld">
+      <pc:chgData name="beren sarı" userId="ee17b9781157bf7b" providerId="Windows Live" clId="Web-{A007B13A-C327-B20E-22C3-E5F201244D86}" dt="2025-03-10T05:27:00.443" v="147" actId="20577"/>
+      <pc:docMkLst>
+        <pc:docMk/>
+      </pc:docMkLst>
+      <pc:sldChg chg="modSp new">
+        <pc:chgData name="beren sarı" userId="ee17b9781157bf7b" providerId="Windows Live" clId="Web-{A007B13A-C327-B20E-22C3-E5F201244D86}" dt="2025-03-10T05:27:00.443" v="147" actId="20577"/>
+        <pc:sldMkLst>
+          <pc:docMk/>
+          <pc:sldMk cId="2384371452" sldId="263"/>
+        </pc:sldMkLst>
+        <pc:spChg chg="mod">
+          <ac:chgData name="beren sarı" userId="ee17b9781157bf7b" providerId="Windows Live" clId="Web-{A007B13A-C327-B20E-22C3-E5F201244D86}" dt="2025-03-10T05:27:00.443" v="147" actId="20577"/>
+          <ac:spMkLst>
+            <pc:docMk/>
+            <pc:sldMk cId="2384371452" sldId="263"/>
+            <ac:spMk id="2" creationId="{D43EA382-ED49-6F41-90F3-D705F4AD4893}"/>
+          </ac:spMkLst>
+        </pc:spChg>
+        <pc:spChg chg="mod">
+          <ac:chgData name="beren sarı" userId="ee17b9781157bf7b" providerId="Windows Live" clId="Web-{A007B13A-C327-B20E-22C3-E5F201244D86}" dt="2025-03-10T05:26:49.959" v="145" actId="20577"/>
+          <ac:spMkLst>
+            <pc:docMk/>
+            <pc:sldMk cId="2384371452" sldId="263"/>
+            <ac:spMk id="3" creationId="{6BD752B1-1A22-2E31-772E-B3E895F646F4}"/>
+          </ac:spMkLst>
+        </pc:spChg>
+      </pc:sldChg>
+    </pc:docChg>
+  </pc:docChgLst>
   <pc:docChgLst>
     <pc:chgData name="beren sarı" userId="ee17b9781157bf7b" providerId="Windows Live" clId="Web-{7FEB1BE5-1E02-0BC5-3587-561BE8312F4A}"/>
     <pc:docChg chg="addSld modSld">
@@ -6464,6 +6498,170 @@
 </p:sld>
 </file>
 
+<file path=ppt/slides/slide8.xml><?xml version="1.0" encoding="utf-8"?>
+<p:sld xmlns:a="http://schemas.openxmlformats.org/drawingml/2006/main" xmlns:r="http://schemas.openxmlformats.org/officeDocument/2006/relationships" xmlns:p="http://schemas.openxmlformats.org/presentationml/2006/main">
+  <p:cSld>
+    <p:spTree>
+      <p:nvGrpSpPr>
+        <p:cNvPr id="1" name=""/>
+        <p:cNvGrpSpPr/>
+        <p:nvPr/>
+      </p:nvGrpSpPr>
+      <p:grpSpPr>
+        <a:xfrm>
+          <a:off x="0" y="0"/>
+          <a:ext cx="0" cy="0"/>
+          <a:chOff x="0" y="0"/>
+          <a:chExt cx="0" cy="0"/>
+        </a:xfrm>
+      </p:grpSpPr>
+      <p:sp>
+        <p:nvSpPr>
+          <p:cNvPr id="2" name="Başlık 1">
+            <a:extLst>
+              <a:ext uri="{FF2B5EF4-FFF2-40B4-BE49-F238E27FC236}">
+                <a16:creationId xmlns:a16="http://schemas.microsoft.com/office/drawing/2014/main" id="{D43EA382-ED49-6F41-90F3-D705F4AD4893}"/>
+              </a:ext>
+            </a:extLst>
+          </p:cNvPr>
+          <p:cNvSpPr>
+            <a:spLocks noGrp="1"/>
+          </p:cNvSpPr>
+          <p:nvPr>
+            <p:ph type="title"/>
+          </p:nvPr>
+        </p:nvSpPr>
+        <p:spPr>
+          <a:xfrm>
+            <a:off x="1371600" y="685800"/>
+            <a:ext cx="9601200" cy="2745840"/>
+          </a:xfrm>
+        </p:spPr>
+        <p:txBody>
+          <a:bodyPr/>
+          <a:lstStyle/>
+          <a:p>
+            <a:pPr marL="571500" indent="-571500">
+              <a:buFont typeface="Arial"/>
+              <a:buChar char="•"/>
+            </a:pPr>
+            <a:r>
+              <a:rPr lang="tr-TR" b="1" dirty="0" err="1"/>
+              <a:t>Fetch</a:t>
+            </a:r>
+            <a:br>
+              <a:rPr lang="tr-TR" b="1" dirty="0"/>
+            </a:br>
+            <a:r>
+              <a:rPr lang="tr-TR" sz="2400" dirty="0"/>
+              <a:t>Değişikliklerin ne olduğunu listeler ama </a:t>
+            </a:r>
+            <a:r>
+              <a:rPr lang="tr-TR" sz="2400" dirty="0" err="1"/>
+              <a:t>local</a:t>
+            </a:r>
+            <a:r>
+              <a:rPr lang="tr-TR" sz="2400" dirty="0"/>
+              <a:t> </a:t>
+            </a:r>
+            <a:r>
+              <a:rPr lang="tr-TR" sz="2400" dirty="0" err="1"/>
+              <a:t>branche</a:t>
+            </a:r>
+            <a:r>
+              <a:rPr lang="tr-TR" sz="2400" dirty="0"/>
+              <a:t> </a:t>
+            </a:r>
+            <a:r>
+              <a:rPr lang="tr-TR" sz="2400" dirty="0" err="1"/>
+              <a:t>almaz.Değişiklikleri</a:t>
+            </a:r>
+            <a:r>
+              <a:rPr lang="tr-TR" sz="2400" dirty="0"/>
+              <a:t> birleştirmeden önce inceleme için idealdir.</a:t>
+            </a:r>
+            <a:endParaRPr lang="tr-TR" sz="2400" u="sng" dirty="0"/>
+          </a:p>
+        </p:txBody>
+      </p:sp>
+      <p:sp>
+        <p:nvSpPr>
+          <p:cNvPr id="3" name="İçerik Yer Tutucusu 2">
+            <a:extLst>
+              <a:ext uri="{FF2B5EF4-FFF2-40B4-BE49-F238E27FC236}">
+                <a16:creationId xmlns:a16="http://schemas.microsoft.com/office/drawing/2014/main" id="{6BD752B1-1A22-2E31-772E-B3E895F646F4}"/>
+              </a:ext>
+            </a:extLst>
+          </p:cNvPr>
+          <p:cNvSpPr>
+            <a:spLocks noGrp="1"/>
+          </p:cNvSpPr>
+          <p:nvPr>
+            <p:ph idx="1"/>
+          </p:nvPr>
+        </p:nvSpPr>
+        <p:spPr>
+          <a:xfrm>
+            <a:off x="1371600" y="3425227"/>
+            <a:ext cx="9601200" cy="2442173"/>
+          </a:xfrm>
+        </p:spPr>
+        <p:txBody>
+          <a:bodyPr vert="horz" lIns="91440" tIns="45720" rIns="91440" bIns="45720" rtlCol="0" anchor="t">
+            <a:normAutofit/>
+          </a:bodyPr>
+          <a:lstStyle/>
+          <a:p>
+            <a:pPr marL="383540" indent="-383540">
+              <a:buFont typeface="Arial" panose="020B0503020102020204" pitchFamily="34" charset="0"/>
+              <a:buChar char="•"/>
+            </a:pPr>
+            <a:r>
+              <a:rPr lang="tr-TR" sz="4400" b="1" err="1"/>
+              <a:t>Pull</a:t>
+            </a:r>
+            <a:endParaRPr lang="tr-TR"/>
+          </a:p>
+          <a:p>
+            <a:pPr marL="457200" lvl="1" indent="0">
+              <a:buNone/>
+            </a:pPr>
+            <a:r>
+              <a:rPr lang="tr-TR" sz="2400" i="0" dirty="0"/>
+              <a:t>Uzak sunucudaki </a:t>
+            </a:r>
+            <a:r>
+              <a:rPr lang="tr-TR" sz="2400" i="0" dirty="0" err="1"/>
+              <a:t>branchte</a:t>
+            </a:r>
+            <a:r>
+              <a:rPr lang="tr-TR" sz="2400" i="0" dirty="0"/>
+              <a:t> ne varsa </a:t>
+            </a:r>
+            <a:r>
+              <a:rPr lang="tr-TR" sz="2400" i="0" dirty="0" err="1"/>
+              <a:t>locale</a:t>
+            </a:r>
+            <a:r>
+              <a:rPr lang="tr-TR" sz="2400" i="0" dirty="0"/>
+              <a:t> alır.</a:t>
+            </a:r>
+          </a:p>
+        </p:txBody>
+      </p:sp>
+    </p:spTree>
+    <p:extLst>
+      <p:ext uri="{BB962C8B-B14F-4D97-AF65-F5344CB8AC3E}">
+        <p14:creationId xmlns:p14="http://schemas.microsoft.com/office/powerpoint/2010/main" val="2384371452"/>
+      </p:ext>
+    </p:extLst>
+  </p:cSld>
+  <p:clrMapOvr>
+    <a:masterClrMapping/>
+  </p:clrMapOvr>
+</p:sld>
+</file>
+
 <file path=ppt/theme/theme1.xml><?xml version="1.0" encoding="utf-8"?>
 <a:theme xmlns:a="http://schemas.openxmlformats.org/drawingml/2006/main" name="Ekin">
   <a:themeElements>

</xml_diff>